<commit_message>
start - change theme
</commit_message>
<xml_diff>
--- a/enginxGrandFinale.pptx
+++ b/enginxGrandFinale.pptx
@@ -2,7 +2,7 @@
 <file path=ppt/presentation.xml><?xml version="1.0" encoding="utf-8"?>
 <p:presentation xmlns:a="http://schemas.openxmlformats.org/drawingml/2006/main" xmlns:r="http://schemas.openxmlformats.org/officeDocument/2006/relationships" xmlns:p="http://schemas.openxmlformats.org/presentationml/2006/main" saveSubsetFonts="1">
   <p:sldMasterIdLst>
-    <p:sldMasterId id="2147483648" r:id="rId1"/>
+    <p:sldMasterId id="2147483822" r:id="rId1"/>
   </p:sldMasterIdLst>
   <p:sldIdLst>
     <p:sldId id="256" r:id="rId2"/>
@@ -108,7 +108,7 @@
 </file>
 
 <file path=ppt/slideLayouts/slideLayout1.xml><?xml version="1.0" encoding="utf-8"?>
-<p:sldLayout xmlns:a="http://schemas.openxmlformats.org/drawingml/2006/main" xmlns:r="http://schemas.openxmlformats.org/officeDocument/2006/relationships" xmlns:p="http://schemas.openxmlformats.org/presentationml/2006/main" type="title" preserve="1">
+<p:sldLayout xmlns:a="http://schemas.openxmlformats.org/drawingml/2006/main" xmlns:r="http://schemas.openxmlformats.org/officeDocument/2006/relationships" xmlns:p="http://schemas.openxmlformats.org/presentationml/2006/main" showMasterSp="0" type="title" preserve="1">
   <p:cSld name="Title Slide">
     <p:spTree>
       <p:nvGrpSpPr>
@@ -124,31 +124,95 @@
           <a:chExt cx="0" cy="0"/>
         </a:xfrm>
       </p:grpSpPr>
-      <p:sp>
-        <p:nvSpPr>
-          <p:cNvPr id="2" name="Title 1"/>
-          <p:cNvSpPr>
-            <a:spLocks noGrp="1"/>
-          </p:cNvSpPr>
-          <p:nvPr>
-            <p:ph type="ctrTitle"/>
-          </p:nvPr>
-        </p:nvSpPr>
+      <p:pic>
+        <p:nvPicPr>
+          <p:cNvPr id="7" name="Picture 6" descr="horizon.png"/>
+          <p:cNvPicPr>
+            <a:picLocks noChangeAspect="1"/>
+          </p:cNvPicPr>
+          <p:nvPr/>
+        </p:nvPicPr>
+        <p:blipFill>
+          <a:blip r:embed="rId2" cstate="print"/>
+          <a:srcRect t="33333"/>
+          <a:stretch>
+            <a:fillRect/>
+          </a:stretch>
+        </p:blipFill>
         <p:spPr>
           <a:xfrm>
-            <a:off x="685800" y="2130425"/>
-            <a:ext cx="7772400" cy="1470025"/>
+            <a:off x="0" y="0"/>
+            <a:ext cx="9144000" cy="4572000"/>
           </a:xfrm>
+          <a:prstGeom prst="rect">
+            <a:avLst/>
+          </a:prstGeom>
         </p:spPr>
-        <p:txBody>
-          <a:bodyPr/>
-          <a:lstStyle/>
-          <a:p>
-            <a:r>
-              <a:rPr lang="en-US" smtClean="0"/>
-              <a:t>Click to edit Master title style</a:t>
-            </a:r>
-            <a:endParaRPr lang="en-US"/>
+      </p:pic>
+      <p:sp>
+        <p:nvSpPr>
+          <p:cNvPr id="4" name="Date Placeholder 3"/>
+          <p:cNvSpPr>
+            <a:spLocks noGrp="1"/>
+          </p:cNvSpPr>
+          <p:nvPr>
+            <p:ph type="dt" sz="half" idx="10"/>
+          </p:nvPr>
+        </p:nvSpPr>
+        <p:spPr/>
+        <p:txBody>
+          <a:bodyPr/>
+          <a:lstStyle/>
+          <a:p>
+            <a:fld id="{DB32461A-250E-4A29-9E9B-599CA3838FA1}" type="datetime1">
+              <a:rPr lang="en-US" smtClean="0"/>
+              <a:pPr/>
+              <a:t>8/26/2018</a:t>
+            </a:fld>
+            <a:endParaRPr lang="en-US" dirty="0"/>
+          </a:p>
+        </p:txBody>
+      </p:sp>
+      <p:sp>
+        <p:nvSpPr>
+          <p:cNvPr id="5" name="Footer Placeholder 4"/>
+          <p:cNvSpPr>
+            <a:spLocks noGrp="1"/>
+          </p:cNvSpPr>
+          <p:nvPr>
+            <p:ph type="ftr" sz="quarter" idx="11"/>
+          </p:nvPr>
+        </p:nvSpPr>
+        <p:spPr/>
+        <p:txBody>
+          <a:bodyPr/>
+          <a:lstStyle/>
+          <a:p>
+            <a:endParaRPr lang="en-US" dirty="0"/>
+          </a:p>
+        </p:txBody>
+      </p:sp>
+      <p:sp>
+        <p:nvSpPr>
+          <p:cNvPr id="6" name="Slide Number Placeholder 5"/>
+          <p:cNvSpPr>
+            <a:spLocks noGrp="1"/>
+          </p:cNvSpPr>
+          <p:nvPr>
+            <p:ph type="sldNum" sz="quarter" idx="12"/>
+          </p:nvPr>
+        </p:nvSpPr>
+        <p:spPr/>
+        <p:txBody>
+          <a:bodyPr/>
+          <a:lstStyle/>
+          <a:p>
+            <a:fld id="{CF40B41D-FD10-4A38-B39B-626510BD49B7}" type="slidenum">
+              <a:rPr lang="en-US" smtClean="0"/>
+              <a:pPr/>
+              <a:t>‹#›</a:t>
+            </a:fld>
+            <a:endParaRPr lang="en-US" dirty="0"/>
           </a:p>
         </p:txBody>
       </p:sp>
@@ -164,20 +228,20 @@
         </p:nvSpPr>
         <p:spPr>
           <a:xfrm>
-            <a:off x="1371600" y="3886200"/>
+            <a:off x="1219200" y="3886200"/>
             <a:ext cx="6400800" cy="1752600"/>
           </a:xfrm>
         </p:spPr>
         <p:txBody>
-          <a:bodyPr/>
+          <a:bodyPr>
+            <a:normAutofit/>
+          </a:bodyPr>
           <a:lstStyle>
             <a:lvl1pPr marL="0" indent="0" algn="ctr">
               <a:buNone/>
-              <a:defRPr>
+              <a:defRPr sz="1700" baseline="0">
                 <a:solidFill>
-                  <a:schemeClr val="tx1">
-                    <a:tint val="75000"/>
-                  </a:schemeClr>
+                  <a:schemeClr val="tx2"/>
                 </a:solidFill>
               </a:defRPr>
             </a:lvl1pPr>
@@ -267,81 +331,43 @@
               <a:rPr lang="en-US" smtClean="0"/>
               <a:t>Click to edit Master subtitle style</a:t>
             </a:r>
-            <a:endParaRPr lang="en-US"/>
-          </a:p>
-        </p:txBody>
-      </p:sp>
-      <p:sp>
-        <p:nvSpPr>
-          <p:cNvPr id="4" name="Date Placeholder 3"/>
-          <p:cNvSpPr>
-            <a:spLocks noGrp="1"/>
-          </p:cNvSpPr>
-          <p:nvPr>
-            <p:ph type="dt" sz="half" idx="10"/>
-          </p:nvPr>
-        </p:nvSpPr>
-        <p:spPr/>
-        <p:txBody>
-          <a:bodyPr/>
-          <a:lstStyle/>
-          <a:p>
-            <a:fld id="{445E6F58-B168-42D3-B0F1-E5314F54A3DC}" type="datetimeFigureOut">
-              <a:rPr lang="en-US" smtClean="0"/>
-              <a:t>8/26/2018</a:t>
-            </a:fld>
-            <a:endParaRPr lang="en-US"/>
-          </a:p>
-        </p:txBody>
-      </p:sp>
-      <p:sp>
-        <p:nvSpPr>
-          <p:cNvPr id="5" name="Footer Placeholder 4"/>
-          <p:cNvSpPr>
-            <a:spLocks noGrp="1"/>
-          </p:cNvSpPr>
-          <p:nvPr>
-            <p:ph type="ftr" sz="quarter" idx="11"/>
-          </p:nvPr>
-        </p:nvSpPr>
-        <p:spPr/>
-        <p:txBody>
-          <a:bodyPr/>
-          <a:lstStyle/>
-          <a:p>
-            <a:endParaRPr lang="en-US"/>
-          </a:p>
-        </p:txBody>
-      </p:sp>
-      <p:sp>
-        <p:nvSpPr>
-          <p:cNvPr id="6" name="Slide Number Placeholder 5"/>
-          <p:cNvSpPr>
-            <a:spLocks noGrp="1"/>
-          </p:cNvSpPr>
-          <p:nvPr>
-            <p:ph type="sldNum" sz="quarter" idx="12"/>
-          </p:nvPr>
-        </p:nvSpPr>
-        <p:spPr/>
-        <p:txBody>
-          <a:bodyPr/>
-          <a:lstStyle/>
-          <a:p>
-            <a:fld id="{E729AAF1-823D-4748-B9C0-94F3C09A8791}" type="slidenum">
-              <a:rPr lang="en-US" smtClean="0"/>
-              <a:t>‹#›</a:t>
-            </a:fld>
-            <a:endParaRPr lang="en-US"/>
+            <a:endParaRPr lang="en-US" dirty="0"/>
+          </a:p>
+        </p:txBody>
+      </p:sp>
+      <p:sp>
+        <p:nvSpPr>
+          <p:cNvPr id="2" name="Title 1"/>
+          <p:cNvSpPr>
+            <a:spLocks noGrp="1"/>
+          </p:cNvSpPr>
+          <p:nvPr>
+            <p:ph type="ctrTitle"/>
+          </p:nvPr>
+        </p:nvSpPr>
+        <p:spPr>
+          <a:xfrm>
+            <a:off x="685800" y="2007888"/>
+            <a:ext cx="7772400" cy="1470025"/>
+          </a:xfrm>
+        </p:spPr>
+        <p:txBody>
+          <a:bodyPr/>
+          <a:lstStyle>
+            <a:lvl1pPr algn="ctr">
+              <a:defRPr sz="3200"/>
+            </a:lvl1pPr>
+          </a:lstStyle>
+          <a:p>
+            <a:r>
+              <a:rPr lang="en-US" smtClean="0"/>
+              <a:t>Click to edit Master title style</a:t>
+            </a:r>
+            <a:endParaRPr lang="en-US" dirty="0"/>
           </a:p>
         </p:txBody>
       </p:sp>
     </p:spTree>
-    <p:extLst>
-      <p:ext uri="{BB962C8B-B14F-4D97-AF65-F5344CB8AC3E}">
-        <p14:creationId xmlns:p14="http://schemas.microsoft.com/office/powerpoint/2010/main" val="2137972343"/>
-      </p:ext>
-    </p:extLst>
   </p:cSld>
   <p:clrMapOvr>
     <a:masterClrMapping/>
@@ -385,79 +411,80 @@
               <a:rPr lang="en-US" smtClean="0"/>
               <a:t>Click to edit Master title style</a:t>
             </a:r>
+            <a:endParaRPr lang="en-US" dirty="0"/>
+          </a:p>
+        </p:txBody>
+      </p:sp>
+      <p:sp>
+        <p:nvSpPr>
+          <p:cNvPr id="3" name="Vertical Text Placeholder 2"/>
+          <p:cNvSpPr>
+            <a:spLocks noGrp="1"/>
+          </p:cNvSpPr>
+          <p:nvPr>
+            <p:ph type="body" orient="vert" idx="1"/>
+          </p:nvPr>
+        </p:nvSpPr>
+        <p:spPr/>
+        <p:txBody>
+          <a:bodyPr vert="eaVert"/>
+          <a:lstStyle/>
+          <a:p>
+            <a:pPr lvl="0"/>
+            <a:r>
+              <a:rPr lang="en-US" smtClean="0"/>
+              <a:t>Click to edit Master text styles</a:t>
+            </a:r>
+          </a:p>
+          <a:p>
+            <a:pPr lvl="1"/>
+            <a:r>
+              <a:rPr lang="en-US" smtClean="0"/>
+              <a:t>Second level</a:t>
+            </a:r>
+          </a:p>
+          <a:p>
+            <a:pPr lvl="2"/>
+            <a:r>
+              <a:rPr lang="en-US" smtClean="0"/>
+              <a:t>Third level</a:t>
+            </a:r>
+          </a:p>
+          <a:p>
+            <a:pPr lvl="3"/>
+            <a:r>
+              <a:rPr lang="en-US" smtClean="0"/>
+              <a:t>Fourth level</a:t>
+            </a:r>
+          </a:p>
+          <a:p>
+            <a:pPr lvl="4"/>
+            <a:r>
+              <a:rPr lang="en-US" smtClean="0"/>
+              <a:t>Fifth level</a:t>
+            </a:r>
             <a:endParaRPr lang="en-US"/>
           </a:p>
         </p:txBody>
       </p:sp>
       <p:sp>
         <p:nvSpPr>
-          <p:cNvPr id="3" name="Vertical Text Placeholder 2"/>
-          <p:cNvSpPr>
-            <a:spLocks noGrp="1"/>
-          </p:cNvSpPr>
-          <p:nvPr>
-            <p:ph type="body" orient="vert" idx="1"/>
+          <p:cNvPr id="4" name="Date Placeholder 3"/>
+          <p:cNvSpPr>
+            <a:spLocks noGrp="1"/>
+          </p:cNvSpPr>
+          <p:nvPr>
+            <p:ph type="dt" sz="half" idx="10"/>
           </p:nvPr>
         </p:nvSpPr>
         <p:spPr/>
         <p:txBody>
-          <a:bodyPr vert="eaVert"/>
-          <a:lstStyle/>
-          <a:p>
-            <a:pPr lvl="0"/>
-            <a:r>
-              <a:rPr lang="en-US" smtClean="0"/>
-              <a:t>Click to edit Master text styles</a:t>
-            </a:r>
-          </a:p>
-          <a:p>
-            <a:pPr lvl="1"/>
-            <a:r>
-              <a:rPr lang="en-US" smtClean="0"/>
-              <a:t>Second level</a:t>
-            </a:r>
-          </a:p>
-          <a:p>
-            <a:pPr lvl="2"/>
-            <a:r>
-              <a:rPr lang="en-US" smtClean="0"/>
-              <a:t>Third level</a:t>
-            </a:r>
-          </a:p>
-          <a:p>
-            <a:pPr lvl="3"/>
-            <a:r>
-              <a:rPr lang="en-US" smtClean="0"/>
-              <a:t>Fourth level</a:t>
-            </a:r>
-          </a:p>
-          <a:p>
-            <a:pPr lvl="4"/>
-            <a:r>
-              <a:rPr lang="en-US" smtClean="0"/>
-              <a:t>Fifth level</a:t>
-            </a:r>
-            <a:endParaRPr lang="en-US"/>
-          </a:p>
-        </p:txBody>
-      </p:sp>
-      <p:sp>
-        <p:nvSpPr>
-          <p:cNvPr id="4" name="Date Placeholder 3"/>
-          <p:cNvSpPr>
-            <a:spLocks noGrp="1"/>
-          </p:cNvSpPr>
-          <p:nvPr>
-            <p:ph type="dt" sz="half" idx="10"/>
-          </p:nvPr>
-        </p:nvSpPr>
-        <p:spPr/>
-        <p:txBody>
-          <a:bodyPr/>
-          <a:lstStyle/>
-          <a:p>
-            <a:fld id="{445E6F58-B168-42D3-B0F1-E5314F54A3DC}" type="datetimeFigureOut">
-              <a:rPr lang="en-US" smtClean="0"/>
+          <a:bodyPr/>
+          <a:lstStyle/>
+          <a:p>
+            <a:fld id="{78C81099-48EC-46A3-9530-F58EB96AF77C}" type="datetime1">
+              <a:rPr lang="en-US" smtClean="0"/>
+              <a:pPr/>
               <a:t>8/26/2018</a:t>
             </a:fld>
             <a:endParaRPr lang="en-US"/>
@@ -507,11 +534,6 @@
         </p:txBody>
       </p:sp>
     </p:spTree>
-    <p:extLst>
-      <p:ext uri="{BB962C8B-B14F-4D97-AF65-F5344CB8AC3E}">
-        <p14:creationId xmlns:p14="http://schemas.microsoft.com/office/powerpoint/2010/main" val="4009080590"/>
-      </p:ext>
-    </p:extLst>
   </p:cSld>
   <p:clrMapOvr>
     <a:masterClrMapping/>
@@ -560,7 +582,7 @@
               <a:rPr lang="en-US" smtClean="0"/>
               <a:t>Click to edit Master title style</a:t>
             </a:r>
-            <a:endParaRPr lang="en-US"/>
+            <a:endParaRPr lang="en-US" dirty="0"/>
           </a:p>
         </p:txBody>
       </p:sp>
@@ -636,8 +658,9 @@
           <a:bodyPr/>
           <a:lstStyle/>
           <a:p>
-            <a:fld id="{445E6F58-B168-42D3-B0F1-E5314F54A3DC}" type="datetimeFigureOut">
-              <a:rPr lang="en-US" smtClean="0"/>
+            <a:fld id="{FF697E24-FFB9-4C73-8C6D-E02A7AD33DB8}" type="datetime1">
+              <a:rPr lang="en-US" smtClean="0"/>
+              <a:pPr/>
               <a:t>8/26/2018</a:t>
             </a:fld>
             <a:endParaRPr lang="en-US"/>
@@ -687,11 +710,6 @@
         </p:txBody>
       </p:sp>
     </p:spTree>
-    <p:extLst>
-      <p:ext uri="{BB962C8B-B14F-4D97-AF65-F5344CB8AC3E}">
-        <p14:creationId xmlns:p14="http://schemas.microsoft.com/office/powerpoint/2010/main" val="2245730125"/>
-      </p:ext>
-    </p:extLst>
   </p:cSld>
   <p:clrMapOvr>
     <a:masterClrMapping/>
@@ -726,88 +744,42 @@
             <p:ph type="title"/>
           </p:nvPr>
         </p:nvSpPr>
+        <p:spPr>
+          <a:xfrm>
+            <a:off x="609600" y="274638"/>
+            <a:ext cx="7924800" cy="1143000"/>
+          </a:xfrm>
+        </p:spPr>
+        <p:txBody>
+          <a:bodyPr/>
+          <a:lstStyle/>
+          <a:p>
+            <a:r>
+              <a:rPr lang="en-US" smtClean="0"/>
+              <a:t>Click to edit Master title style</a:t>
+            </a:r>
+            <a:endParaRPr lang="en-US" dirty="0"/>
+          </a:p>
+        </p:txBody>
+      </p:sp>
+      <p:sp>
+        <p:nvSpPr>
+          <p:cNvPr id="4" name="Date Placeholder 3"/>
+          <p:cNvSpPr>
+            <a:spLocks noGrp="1"/>
+          </p:cNvSpPr>
+          <p:nvPr>
+            <p:ph type="dt" sz="half" idx="10"/>
+          </p:nvPr>
+        </p:nvSpPr>
         <p:spPr/>
         <p:txBody>
           <a:bodyPr/>
           <a:lstStyle/>
           <a:p>
-            <a:r>
-              <a:rPr lang="en-US" smtClean="0"/>
-              <a:t>Click to edit Master title style</a:t>
-            </a:r>
-            <a:endParaRPr lang="en-US"/>
-          </a:p>
-        </p:txBody>
-      </p:sp>
-      <p:sp>
-        <p:nvSpPr>
-          <p:cNvPr id="3" name="Content Placeholder 2"/>
-          <p:cNvSpPr>
-            <a:spLocks noGrp="1"/>
-          </p:cNvSpPr>
-          <p:nvPr>
-            <p:ph idx="1"/>
-          </p:nvPr>
-        </p:nvSpPr>
-        <p:spPr/>
-        <p:txBody>
-          <a:bodyPr/>
-          <a:lstStyle/>
-          <a:p>
-            <a:pPr lvl="0"/>
-            <a:r>
-              <a:rPr lang="en-US" smtClean="0"/>
-              <a:t>Click to edit Master text styles</a:t>
-            </a:r>
-          </a:p>
-          <a:p>
-            <a:pPr lvl="1"/>
-            <a:r>
-              <a:rPr lang="en-US" smtClean="0"/>
-              <a:t>Second level</a:t>
-            </a:r>
-          </a:p>
-          <a:p>
-            <a:pPr lvl="2"/>
-            <a:r>
-              <a:rPr lang="en-US" smtClean="0"/>
-              <a:t>Third level</a:t>
-            </a:r>
-          </a:p>
-          <a:p>
-            <a:pPr lvl="3"/>
-            <a:r>
-              <a:rPr lang="en-US" smtClean="0"/>
-              <a:t>Fourth level</a:t>
-            </a:r>
-          </a:p>
-          <a:p>
-            <a:pPr lvl="4"/>
-            <a:r>
-              <a:rPr lang="en-US" smtClean="0"/>
-              <a:t>Fifth level</a:t>
-            </a:r>
-            <a:endParaRPr lang="en-US"/>
-          </a:p>
-        </p:txBody>
-      </p:sp>
-      <p:sp>
-        <p:nvSpPr>
-          <p:cNvPr id="4" name="Date Placeholder 3"/>
-          <p:cNvSpPr>
-            <a:spLocks noGrp="1"/>
-          </p:cNvSpPr>
-          <p:nvPr>
-            <p:ph type="dt" sz="half" idx="10"/>
-          </p:nvPr>
-        </p:nvSpPr>
-        <p:spPr/>
-        <p:txBody>
-          <a:bodyPr/>
-          <a:lstStyle/>
-          <a:p>
-            <a:fld id="{445E6F58-B168-42D3-B0F1-E5314F54A3DC}" type="datetimeFigureOut">
-              <a:rPr lang="en-US" smtClean="0"/>
+            <a:fld id="{DF1AD66C-382E-48AD-8F4C-E87C4D4A8B28}" type="datetime1">
+              <a:rPr lang="en-US" smtClean="0"/>
+              <a:pPr/>
               <a:t>8/26/2018</a:t>
             </a:fld>
             <a:endParaRPr lang="en-US"/>
@@ -856,12 +828,64 @@
           </a:p>
         </p:txBody>
       </p:sp>
+      <p:sp>
+        <p:nvSpPr>
+          <p:cNvPr id="8" name="Content Placeholder 7"/>
+          <p:cNvSpPr>
+            <a:spLocks noGrp="1"/>
+          </p:cNvSpPr>
+          <p:nvPr>
+            <p:ph sz="quarter" idx="13"/>
+          </p:nvPr>
+        </p:nvSpPr>
+        <p:spPr>
+          <a:xfrm>
+            <a:off x="609600" y="1600200"/>
+            <a:ext cx="7924800" cy="4114800"/>
+          </a:xfrm>
+        </p:spPr>
+        <p:txBody>
+          <a:bodyPr/>
+          <a:lstStyle/>
+          <a:p>
+            <a:pPr lvl="0"/>
+            <a:r>
+              <a:rPr lang="en-US" smtClean="0"/>
+              <a:t>Click to edit Master text styles</a:t>
+            </a:r>
+          </a:p>
+          <a:p>
+            <a:pPr lvl="1"/>
+            <a:r>
+              <a:rPr lang="en-US" smtClean="0"/>
+              <a:t>Second level</a:t>
+            </a:r>
+          </a:p>
+          <a:p>
+            <a:pPr lvl="2"/>
+            <a:r>
+              <a:rPr lang="en-US" smtClean="0"/>
+              <a:t>Third level</a:t>
+            </a:r>
+          </a:p>
+          <a:p>
+            <a:pPr lvl="3"/>
+            <a:r>
+              <a:rPr lang="en-US" smtClean="0"/>
+              <a:t>Fourth level</a:t>
+            </a:r>
+          </a:p>
+          <a:p>
+            <a:pPr lvl="4"/>
+            <a:r>
+              <a:rPr lang="en-US" smtClean="0"/>
+              <a:t>Fifth level</a:t>
+            </a:r>
+            <a:endParaRPr lang="en-US" dirty="0"/>
+          </a:p>
+        </p:txBody>
+      </p:sp>
     </p:spTree>
-    <p:extLst>
-      <p:ext uri="{BB962C8B-B14F-4D97-AF65-F5344CB8AC3E}">
-        <p14:creationId xmlns:p14="http://schemas.microsoft.com/office/powerpoint/2010/main" val="3679116035"/>
-      </p:ext>
-    </p:extLst>
   </p:cSld>
   <p:clrMapOvr>
     <a:masterClrMapping/>
@@ -870,7 +894,7 @@
 </file>
 
 <file path=ppt/slideLayouts/slideLayout3.xml><?xml version="1.0" encoding="utf-8"?>
-<p:sldLayout xmlns:a="http://schemas.openxmlformats.org/drawingml/2006/main" xmlns:r="http://schemas.openxmlformats.org/officeDocument/2006/relationships" xmlns:p="http://schemas.openxmlformats.org/presentationml/2006/main" type="secHead" preserve="1">
+<p:sldLayout xmlns:a="http://schemas.openxmlformats.org/drawingml/2006/main" xmlns:r="http://schemas.openxmlformats.org/officeDocument/2006/relationships" xmlns:p="http://schemas.openxmlformats.org/presentationml/2006/main" showMasterSp="0" type="secHead" preserve="1">
   <p:cSld name="Section Header">
     <p:spTree>
       <p:nvGrpSpPr>
@@ -898,15 +922,15 @@
         </p:nvSpPr>
         <p:spPr>
           <a:xfrm>
-            <a:off x="722313" y="4406900"/>
-            <a:ext cx="7772400" cy="1362075"/>
+            <a:off x="609600" y="4962525"/>
+            <a:ext cx="7885113" cy="1362075"/>
           </a:xfrm>
         </p:spPr>
         <p:txBody>
           <a:bodyPr anchor="t"/>
           <a:lstStyle>
             <a:lvl1pPr algn="l">
-              <a:defRPr sz="4000" b="1" cap="all"/>
+              <a:defRPr sz="3200" b="0" i="0" cap="all" baseline="0"/>
             </a:lvl1pPr>
           </a:lstStyle>
           <a:p>
@@ -914,7 +938,7 @@
               <a:rPr lang="en-US" smtClean="0"/>
               <a:t>Click to edit Master title style</a:t>
             </a:r>
-            <a:endParaRPr lang="en-US"/>
+            <a:endParaRPr lang="en-US" dirty="0"/>
           </a:p>
         </p:txBody>
       </p:sp>
@@ -930,20 +954,20 @@
         </p:nvSpPr>
         <p:spPr>
           <a:xfrm>
-            <a:off x="722313" y="2906713"/>
-            <a:ext cx="7772400" cy="1500187"/>
+            <a:off x="609600" y="3462338"/>
+            <a:ext cx="7885113" cy="1500187"/>
           </a:xfrm>
         </p:spPr>
         <p:txBody>
-          <a:bodyPr anchor="b"/>
+          <a:bodyPr anchor="b">
+            <a:normAutofit/>
+          </a:bodyPr>
           <a:lstStyle>
             <a:lvl1pPr marL="0" indent="0">
               <a:buNone/>
-              <a:defRPr sz="2000">
+              <a:defRPr sz="1700" baseline="0">
                 <a:solidFill>
-                  <a:schemeClr val="tx1">
-                    <a:tint val="75000"/>
-                  </a:schemeClr>
+                  <a:schemeClr val="tx2"/>
                 </a:solidFill>
               </a:defRPr>
             </a:lvl1pPr>
@@ -1052,8 +1076,9 @@
           <a:bodyPr/>
           <a:lstStyle/>
           <a:p>
-            <a:fld id="{445E6F58-B168-42D3-B0F1-E5314F54A3DC}" type="datetimeFigureOut">
-              <a:rPr lang="en-US" smtClean="0"/>
+            <a:fld id="{26F4ADA4-35DF-4BD1-8C53-4246F035229A}" type="datetime1">
+              <a:rPr lang="en-US" smtClean="0"/>
+              <a:pPr/>
               <a:t>8/26/2018</a:t>
             </a:fld>
             <a:endParaRPr lang="en-US"/>
@@ -1103,11 +1128,6 @@
         </p:txBody>
       </p:sp>
     </p:spTree>
-    <p:extLst>
-      <p:ext uri="{BB962C8B-B14F-4D97-AF65-F5344CB8AC3E}">
-        <p14:creationId xmlns:p14="http://schemas.microsoft.com/office/powerpoint/2010/main" val="1589419957"/>
-      </p:ext>
-    </p:extLst>
   </p:cSld>
   <p:clrMapOvr>
     <a:masterClrMapping/>
@@ -1134,72 +1154,57 @@
       </p:grpSpPr>
       <p:sp>
         <p:nvSpPr>
-          <p:cNvPr id="2" name="Title 1"/>
-          <p:cNvSpPr>
-            <a:spLocks noGrp="1"/>
-          </p:cNvSpPr>
-          <p:nvPr>
-            <p:ph type="title"/>
-          </p:nvPr>
-        </p:nvSpPr>
-        <p:spPr/>
-        <p:txBody>
-          <a:bodyPr/>
-          <a:lstStyle/>
-          <a:p>
-            <a:r>
-              <a:rPr lang="en-US" smtClean="0"/>
-              <a:t>Click to edit Master title style</a:t>
-            </a:r>
-            <a:endParaRPr lang="en-US"/>
-          </a:p>
-        </p:txBody>
-      </p:sp>
-      <p:sp>
-        <p:nvSpPr>
-          <p:cNvPr id="3" name="Content Placeholder 2"/>
-          <p:cNvSpPr>
-            <a:spLocks noGrp="1"/>
-          </p:cNvSpPr>
-          <p:nvPr>
-            <p:ph sz="half" idx="1"/>
+          <p:cNvPr id="11" name="Content Placeholder 10"/>
+          <p:cNvSpPr>
+            <a:spLocks noGrp="1"/>
+          </p:cNvSpPr>
+          <p:nvPr>
+            <p:ph sz="quarter" idx="13"/>
           </p:nvPr>
         </p:nvSpPr>
         <p:spPr>
           <a:xfrm>
-            <a:off x="457200" y="1600200"/>
-            <a:ext cx="4038600" cy="4525963"/>
+            <a:off x="609600" y="1600200"/>
+            <a:ext cx="3733800" cy="4114800"/>
           </a:xfrm>
         </p:spPr>
         <p:txBody>
           <a:bodyPr/>
           <a:lstStyle>
-            <a:lvl1pPr>
-              <a:defRPr sz="2800"/>
-            </a:lvl1pPr>
-            <a:lvl2pPr>
-              <a:defRPr sz="2400"/>
-            </a:lvl2pPr>
-            <a:lvl3pPr>
-              <a:defRPr sz="2000"/>
-            </a:lvl3pPr>
-            <a:lvl4pPr>
-              <a:defRPr sz="1800"/>
-            </a:lvl4pPr>
             <a:lvl5pPr>
-              <a:defRPr sz="1800"/>
+              <a:defRPr/>
             </a:lvl5pPr>
             <a:lvl6pPr>
-              <a:defRPr sz="1800"/>
+              <a:buClr>
+                <a:schemeClr val="tx2"/>
+              </a:buClr>
+              <a:buFont typeface="Arial" pitchFamily="34" charset="0"/>
+              <a:buChar char="•"/>
+              <a:defRPr/>
             </a:lvl6pPr>
             <a:lvl7pPr>
-              <a:defRPr sz="1800"/>
+              <a:buClr>
+                <a:schemeClr val="tx2"/>
+              </a:buClr>
+              <a:buFont typeface="Arial" pitchFamily="34" charset="0"/>
+              <a:buChar char="•"/>
+              <a:defRPr/>
             </a:lvl7pPr>
             <a:lvl8pPr>
-              <a:defRPr sz="1800"/>
+              <a:buClr>
+                <a:schemeClr val="tx2"/>
+              </a:buClr>
+              <a:buFont typeface="Arial" pitchFamily="34" charset="0"/>
+              <a:buChar char="•"/>
+              <a:defRPr/>
             </a:lvl8pPr>
             <a:lvl9pPr>
-              <a:defRPr sz="1800"/>
+              <a:buClr>
+                <a:schemeClr val="tx2"/>
+              </a:buClr>
+              <a:buFont typeface="Arial" pitchFamily="34" charset="0"/>
+              <a:buChar char="•"/>
+              <a:defRPr/>
             </a:lvl9pPr>
           </a:lstStyle>
           <a:p>
@@ -1236,55 +1241,52 @@
               <a:rPr lang="en-US" smtClean="0"/>
               <a:t>Fifth level</a:t>
             </a:r>
-            <a:endParaRPr lang="en-US"/>
-          </a:p>
-        </p:txBody>
-      </p:sp>
-      <p:sp>
-        <p:nvSpPr>
-          <p:cNvPr id="4" name="Content Placeholder 3"/>
-          <p:cNvSpPr>
-            <a:spLocks noGrp="1"/>
-          </p:cNvSpPr>
-          <p:nvPr>
-            <p:ph sz="half" idx="2"/>
+            <a:endParaRPr lang="en-US" dirty="0" smtClean="0"/>
+          </a:p>
+        </p:txBody>
+      </p:sp>
+      <p:sp>
+        <p:nvSpPr>
+          <p:cNvPr id="13" name="Content Placeholder 12"/>
+          <p:cNvSpPr>
+            <a:spLocks noGrp="1"/>
+          </p:cNvSpPr>
+          <p:nvPr>
+            <p:ph sz="quarter" idx="14"/>
           </p:nvPr>
         </p:nvSpPr>
         <p:spPr>
           <a:xfrm>
-            <a:off x="4648200" y="1600200"/>
-            <a:ext cx="4038600" cy="4525963"/>
+            <a:off x="4800600" y="1600200"/>
+            <a:ext cx="3733800" cy="4114800"/>
           </a:xfrm>
         </p:spPr>
         <p:txBody>
           <a:bodyPr/>
           <a:lstStyle>
-            <a:lvl1pPr>
-              <a:defRPr sz="2800"/>
-            </a:lvl1pPr>
-            <a:lvl2pPr>
-              <a:defRPr sz="2400"/>
-            </a:lvl2pPr>
-            <a:lvl3pPr>
-              <a:defRPr sz="2000"/>
-            </a:lvl3pPr>
-            <a:lvl4pPr>
-              <a:defRPr sz="1800"/>
-            </a:lvl4pPr>
-            <a:lvl5pPr>
-              <a:defRPr sz="1800"/>
-            </a:lvl5pPr>
             <a:lvl6pPr>
-              <a:defRPr sz="1800"/>
+              <a:buClr>
+                <a:schemeClr val="tx2"/>
+              </a:buClr>
+              <a:defRPr/>
             </a:lvl6pPr>
             <a:lvl7pPr>
-              <a:defRPr sz="1800"/>
+              <a:buClr>
+                <a:schemeClr val="tx2"/>
+              </a:buClr>
+              <a:defRPr/>
             </a:lvl7pPr>
             <a:lvl8pPr>
-              <a:defRPr sz="1800"/>
+              <a:buClr>
+                <a:schemeClr val="tx2"/>
+              </a:buClr>
+              <a:defRPr/>
             </a:lvl8pPr>
             <a:lvl9pPr>
-              <a:defRPr sz="1800"/>
+              <a:buClr>
+                <a:schemeClr val="tx2"/>
+              </a:buClr>
+              <a:defRPr/>
             </a:lvl9pPr>
           </a:lstStyle>
           <a:p>
@@ -1321,7 +1323,35 @@
               <a:rPr lang="en-US" smtClean="0"/>
               <a:t>Fifth level</a:t>
             </a:r>
-            <a:endParaRPr lang="en-US"/>
+            <a:endParaRPr lang="en-US" dirty="0" smtClean="0"/>
+          </a:p>
+        </p:txBody>
+      </p:sp>
+      <p:sp>
+        <p:nvSpPr>
+          <p:cNvPr id="2" name="Title 1"/>
+          <p:cNvSpPr>
+            <a:spLocks noGrp="1"/>
+          </p:cNvSpPr>
+          <p:nvPr>
+            <p:ph type="title"/>
+          </p:nvPr>
+        </p:nvSpPr>
+        <p:spPr>
+          <a:xfrm>
+            <a:off x="609600" y="274638"/>
+            <a:ext cx="7924800" cy="1143000"/>
+          </a:xfrm>
+        </p:spPr>
+        <p:txBody>
+          <a:bodyPr/>
+          <a:lstStyle/>
+          <a:p>
+            <a:r>
+              <a:rPr lang="en-US" smtClean="0"/>
+              <a:t>Click to edit Master title style</a:t>
+            </a:r>
+            <a:endParaRPr lang="en-US" dirty="0"/>
           </a:p>
         </p:txBody>
       </p:sp>
@@ -1340,8 +1370,9 @@
           <a:bodyPr/>
           <a:lstStyle/>
           <a:p>
-            <a:fld id="{445E6F58-B168-42D3-B0F1-E5314F54A3DC}" type="datetimeFigureOut">
-              <a:rPr lang="en-US" smtClean="0"/>
+            <a:fld id="{659F63ED-02B1-490A-8EAD-E0CB136D5388}" type="datetime1">
+              <a:rPr lang="en-US" smtClean="0"/>
+              <a:pPr/>
               <a:t>8/26/2018</a:t>
             </a:fld>
             <a:endParaRPr lang="en-US"/>
@@ -1391,11 +1422,6 @@
         </p:txBody>
       </p:sp>
     </p:spTree>
-    <p:extLst>
-      <p:ext uri="{BB962C8B-B14F-4D97-AF65-F5344CB8AC3E}">
-        <p14:creationId xmlns:p14="http://schemas.microsoft.com/office/powerpoint/2010/main" val="1714702045"/>
-      </p:ext>
-    </p:extLst>
   </p:cSld>
   <p:clrMapOvr>
     <a:masterClrMapping/>
@@ -1422,6 +1448,170 @@
       </p:grpSpPr>
       <p:sp>
         <p:nvSpPr>
+          <p:cNvPr id="13" name="Content Placeholder 12"/>
+          <p:cNvSpPr>
+            <a:spLocks noGrp="1"/>
+          </p:cNvSpPr>
+          <p:nvPr>
+            <p:ph sz="quarter" idx="14"/>
+          </p:nvPr>
+        </p:nvSpPr>
+        <p:spPr>
+          <a:xfrm>
+            <a:off x="4800600" y="2209800"/>
+            <a:ext cx="3733800" cy="3505200"/>
+          </a:xfrm>
+        </p:spPr>
+        <p:txBody>
+          <a:bodyPr/>
+          <a:lstStyle>
+            <a:lvl6pPr>
+              <a:buClr>
+                <a:schemeClr val="tx2"/>
+              </a:buClr>
+              <a:defRPr/>
+            </a:lvl6pPr>
+            <a:lvl7pPr>
+              <a:buClr>
+                <a:schemeClr val="tx2"/>
+              </a:buClr>
+              <a:defRPr/>
+            </a:lvl7pPr>
+            <a:lvl8pPr>
+              <a:buClr>
+                <a:schemeClr val="tx2"/>
+              </a:buClr>
+              <a:defRPr/>
+            </a:lvl8pPr>
+            <a:lvl9pPr>
+              <a:buClr>
+                <a:schemeClr val="tx2"/>
+              </a:buClr>
+              <a:defRPr/>
+            </a:lvl9pPr>
+          </a:lstStyle>
+          <a:p>
+            <a:pPr lvl="0"/>
+            <a:r>
+              <a:rPr lang="en-US" smtClean="0"/>
+              <a:t>Click to edit Master text styles</a:t>
+            </a:r>
+          </a:p>
+          <a:p>
+            <a:pPr lvl="1"/>
+            <a:r>
+              <a:rPr lang="en-US" smtClean="0"/>
+              <a:t>Second level</a:t>
+            </a:r>
+          </a:p>
+          <a:p>
+            <a:pPr lvl="2"/>
+            <a:r>
+              <a:rPr lang="en-US" smtClean="0"/>
+              <a:t>Third level</a:t>
+            </a:r>
+          </a:p>
+          <a:p>
+            <a:pPr lvl="3"/>
+            <a:r>
+              <a:rPr lang="en-US" smtClean="0"/>
+              <a:t>Fourth level</a:t>
+            </a:r>
+          </a:p>
+          <a:p>
+            <a:pPr lvl="4"/>
+            <a:r>
+              <a:rPr lang="en-US" smtClean="0"/>
+              <a:t>Fifth level</a:t>
+            </a:r>
+            <a:endParaRPr lang="en-US" dirty="0" smtClean="0"/>
+          </a:p>
+        </p:txBody>
+      </p:sp>
+      <p:sp>
+        <p:nvSpPr>
+          <p:cNvPr id="11" name="Content Placeholder 10"/>
+          <p:cNvSpPr>
+            <a:spLocks noGrp="1"/>
+          </p:cNvSpPr>
+          <p:nvPr>
+            <p:ph sz="quarter" idx="13"/>
+          </p:nvPr>
+        </p:nvSpPr>
+        <p:spPr>
+          <a:xfrm>
+            <a:off x="609600" y="2209800"/>
+            <a:ext cx="3733800" cy="3505200"/>
+          </a:xfrm>
+        </p:spPr>
+        <p:txBody>
+          <a:bodyPr/>
+          <a:lstStyle>
+            <a:lvl6pPr>
+              <a:buClr>
+                <a:schemeClr val="tx2"/>
+              </a:buClr>
+              <a:defRPr/>
+            </a:lvl6pPr>
+            <a:lvl7pPr>
+              <a:buClr>
+                <a:schemeClr val="tx2"/>
+              </a:buClr>
+              <a:defRPr/>
+            </a:lvl7pPr>
+            <a:lvl8pPr>
+              <a:buClr>
+                <a:schemeClr val="tx2"/>
+              </a:buClr>
+              <a:defRPr/>
+            </a:lvl8pPr>
+            <a:lvl9pPr>
+              <a:buClr>
+                <a:schemeClr val="tx2"/>
+              </a:buClr>
+              <a:defRPr/>
+            </a:lvl9pPr>
+          </a:lstStyle>
+          <a:p>
+            <a:pPr lvl="0"/>
+            <a:r>
+              <a:rPr lang="en-US" smtClean="0"/>
+              <a:t>Click to edit Master text styles</a:t>
+            </a:r>
+          </a:p>
+          <a:p>
+            <a:pPr lvl="1"/>
+            <a:r>
+              <a:rPr lang="en-US" smtClean="0"/>
+              <a:t>Second level</a:t>
+            </a:r>
+          </a:p>
+          <a:p>
+            <a:pPr lvl="2"/>
+            <a:r>
+              <a:rPr lang="en-US" smtClean="0"/>
+              <a:t>Third level</a:t>
+            </a:r>
+          </a:p>
+          <a:p>
+            <a:pPr lvl="3"/>
+            <a:r>
+              <a:rPr lang="en-US" smtClean="0"/>
+              <a:t>Fourth level</a:t>
+            </a:r>
+          </a:p>
+          <a:p>
+            <a:pPr lvl="4"/>
+            <a:r>
+              <a:rPr lang="en-US" smtClean="0"/>
+              <a:t>Fifth level</a:t>
+            </a:r>
+            <a:endParaRPr lang="en-US" dirty="0" smtClean="0"/>
+          </a:p>
+        </p:txBody>
+      </p:sp>
+      <p:sp>
+        <p:nvSpPr>
           <p:cNvPr id="2" name="Title 1"/>
           <p:cNvSpPr>
             <a:spLocks noGrp="1"/>
@@ -1430,7 +1620,12 @@
             <p:ph type="title"/>
           </p:nvPr>
         </p:nvSpPr>
-        <p:spPr/>
+        <p:spPr>
+          <a:xfrm>
+            <a:off x="609600" y="274638"/>
+            <a:ext cx="7924800" cy="1143000"/>
+          </a:xfrm>
+        </p:spPr>
         <p:txBody>
           <a:bodyPr/>
           <a:lstStyle>
@@ -1443,7 +1638,7 @@
               <a:rPr lang="en-US" smtClean="0"/>
               <a:t>Click to edit Master title style</a:t>
             </a:r>
-            <a:endParaRPr lang="en-US"/>
+            <a:endParaRPr lang="en-US" dirty="0"/>
           </a:p>
         </p:txBody>
       </p:sp>
@@ -1459,16 +1654,22 @@
         </p:nvSpPr>
         <p:spPr>
           <a:xfrm>
-            <a:off x="457200" y="1535113"/>
-            <a:ext cx="4040188" cy="639762"/>
+            <a:off x="609600" y="1600199"/>
+            <a:ext cx="3733800" cy="574675"/>
           </a:xfrm>
         </p:spPr>
         <p:txBody>
-          <a:bodyPr anchor="b"/>
+          <a:bodyPr anchor="b">
+            <a:normAutofit/>
+          </a:bodyPr>
           <a:lstStyle>
             <a:lvl1pPr marL="0" indent="0">
               <a:buNone/>
-              <a:defRPr sz="2400" b="1"/>
+              <a:defRPr sz="1700" b="0" i="0" baseline="0">
+                <a:solidFill>
+                  <a:schemeClr val="tx2"/>
+                </a:solidFill>
+              </a:defRPr>
             </a:lvl1pPr>
             <a:lvl2pPr marL="457200" indent="0">
               <a:buNone/>
@@ -1514,111 +1715,32 @@
       </p:sp>
       <p:sp>
         <p:nvSpPr>
-          <p:cNvPr id="4" name="Content Placeholder 3"/>
-          <p:cNvSpPr>
-            <a:spLocks noGrp="1"/>
-          </p:cNvSpPr>
-          <p:nvPr>
-            <p:ph sz="half" idx="2"/>
+          <p:cNvPr id="5" name="Text Placeholder 4"/>
+          <p:cNvSpPr>
+            <a:spLocks noGrp="1"/>
+          </p:cNvSpPr>
+          <p:nvPr>
+            <p:ph type="body" sz="quarter" idx="3"/>
           </p:nvPr>
         </p:nvSpPr>
         <p:spPr>
           <a:xfrm>
-            <a:off x="457200" y="2174875"/>
-            <a:ext cx="4040188" cy="3951288"/>
+            <a:off x="4800600" y="1600199"/>
+            <a:ext cx="3733800" cy="574675"/>
           </a:xfrm>
         </p:spPr>
         <p:txBody>
-          <a:bodyPr/>
-          <a:lstStyle>
-            <a:lvl1pPr>
-              <a:defRPr sz="2400"/>
-            </a:lvl1pPr>
-            <a:lvl2pPr>
-              <a:defRPr sz="2000"/>
-            </a:lvl2pPr>
-            <a:lvl3pPr>
-              <a:defRPr sz="1800"/>
-            </a:lvl3pPr>
-            <a:lvl4pPr>
-              <a:defRPr sz="1600"/>
-            </a:lvl4pPr>
-            <a:lvl5pPr>
-              <a:defRPr sz="1600"/>
-            </a:lvl5pPr>
-            <a:lvl6pPr>
-              <a:defRPr sz="1600"/>
-            </a:lvl6pPr>
-            <a:lvl7pPr>
-              <a:defRPr sz="1600"/>
-            </a:lvl7pPr>
-            <a:lvl8pPr>
-              <a:defRPr sz="1600"/>
-            </a:lvl8pPr>
-            <a:lvl9pPr>
-              <a:defRPr sz="1600"/>
-            </a:lvl9pPr>
-          </a:lstStyle>
-          <a:p>
-            <a:pPr lvl="0"/>
-            <a:r>
-              <a:rPr lang="en-US" smtClean="0"/>
-              <a:t>Click to edit Master text styles</a:t>
-            </a:r>
-          </a:p>
-          <a:p>
-            <a:pPr lvl="1"/>
-            <a:r>
-              <a:rPr lang="en-US" smtClean="0"/>
-              <a:t>Second level</a:t>
-            </a:r>
-          </a:p>
-          <a:p>
-            <a:pPr lvl="2"/>
-            <a:r>
-              <a:rPr lang="en-US" smtClean="0"/>
-              <a:t>Third level</a:t>
-            </a:r>
-          </a:p>
-          <a:p>
-            <a:pPr lvl="3"/>
-            <a:r>
-              <a:rPr lang="en-US" smtClean="0"/>
-              <a:t>Fourth level</a:t>
-            </a:r>
-          </a:p>
-          <a:p>
-            <a:pPr lvl="4"/>
-            <a:r>
-              <a:rPr lang="en-US" smtClean="0"/>
-              <a:t>Fifth level</a:t>
-            </a:r>
-            <a:endParaRPr lang="en-US"/>
-          </a:p>
-        </p:txBody>
-      </p:sp>
-      <p:sp>
-        <p:nvSpPr>
-          <p:cNvPr id="5" name="Text Placeholder 4"/>
-          <p:cNvSpPr>
-            <a:spLocks noGrp="1"/>
-          </p:cNvSpPr>
-          <p:nvPr>
-            <p:ph type="body" sz="quarter" idx="3"/>
-          </p:nvPr>
-        </p:nvSpPr>
-        <p:spPr>
-          <a:xfrm>
-            <a:off x="4645025" y="1535113"/>
-            <a:ext cx="4041775" cy="639762"/>
-          </a:xfrm>
-        </p:spPr>
-        <p:txBody>
-          <a:bodyPr anchor="b"/>
+          <a:bodyPr anchor="b">
+            <a:normAutofit/>
+          </a:bodyPr>
           <a:lstStyle>
             <a:lvl1pPr marL="0" indent="0">
               <a:buNone/>
-              <a:defRPr sz="2400" b="1"/>
+              <a:defRPr sz="1700" b="0" i="0" baseline="0">
+                <a:solidFill>
+                  <a:schemeClr val="tx2"/>
+                </a:solidFill>
+              </a:defRPr>
             </a:lvl1pPr>
             <a:lvl2pPr marL="457200" indent="0">
               <a:buNone/>
@@ -1664,91 +1786,6 @@
       </p:sp>
       <p:sp>
         <p:nvSpPr>
-          <p:cNvPr id="6" name="Content Placeholder 5"/>
-          <p:cNvSpPr>
-            <a:spLocks noGrp="1"/>
-          </p:cNvSpPr>
-          <p:nvPr>
-            <p:ph sz="quarter" idx="4"/>
-          </p:nvPr>
-        </p:nvSpPr>
-        <p:spPr>
-          <a:xfrm>
-            <a:off x="4645025" y="2174875"/>
-            <a:ext cx="4041775" cy="3951288"/>
-          </a:xfrm>
-        </p:spPr>
-        <p:txBody>
-          <a:bodyPr/>
-          <a:lstStyle>
-            <a:lvl1pPr>
-              <a:defRPr sz="2400"/>
-            </a:lvl1pPr>
-            <a:lvl2pPr>
-              <a:defRPr sz="2000"/>
-            </a:lvl2pPr>
-            <a:lvl3pPr>
-              <a:defRPr sz="1800"/>
-            </a:lvl3pPr>
-            <a:lvl4pPr>
-              <a:defRPr sz="1600"/>
-            </a:lvl4pPr>
-            <a:lvl5pPr>
-              <a:defRPr sz="1600"/>
-            </a:lvl5pPr>
-            <a:lvl6pPr>
-              <a:defRPr sz="1600"/>
-            </a:lvl6pPr>
-            <a:lvl7pPr>
-              <a:defRPr sz="1600"/>
-            </a:lvl7pPr>
-            <a:lvl8pPr>
-              <a:defRPr sz="1600"/>
-            </a:lvl8pPr>
-            <a:lvl9pPr>
-              <a:defRPr sz="1600"/>
-            </a:lvl9pPr>
-          </a:lstStyle>
-          <a:p>
-            <a:pPr lvl="0"/>
-            <a:r>
-              <a:rPr lang="en-US" smtClean="0"/>
-              <a:t>Click to edit Master text styles</a:t>
-            </a:r>
-          </a:p>
-          <a:p>
-            <a:pPr lvl="1"/>
-            <a:r>
-              <a:rPr lang="en-US" smtClean="0"/>
-              <a:t>Second level</a:t>
-            </a:r>
-          </a:p>
-          <a:p>
-            <a:pPr lvl="2"/>
-            <a:r>
-              <a:rPr lang="en-US" smtClean="0"/>
-              <a:t>Third level</a:t>
-            </a:r>
-          </a:p>
-          <a:p>
-            <a:pPr lvl="3"/>
-            <a:r>
-              <a:rPr lang="en-US" smtClean="0"/>
-              <a:t>Fourth level</a:t>
-            </a:r>
-          </a:p>
-          <a:p>
-            <a:pPr lvl="4"/>
-            <a:r>
-              <a:rPr lang="en-US" smtClean="0"/>
-              <a:t>Fifth level</a:t>
-            </a:r>
-            <a:endParaRPr lang="en-US"/>
-          </a:p>
-        </p:txBody>
-      </p:sp>
-      <p:sp>
-        <p:nvSpPr>
           <p:cNvPr id="7" name="Date Placeholder 6"/>
           <p:cNvSpPr>
             <a:spLocks noGrp="1"/>
@@ -1762,8 +1799,9 @@
           <a:bodyPr/>
           <a:lstStyle/>
           <a:p>
-            <a:fld id="{445E6F58-B168-42D3-B0F1-E5314F54A3DC}" type="datetimeFigureOut">
-              <a:rPr lang="en-US" smtClean="0"/>
+            <a:fld id="{6F771BB6-685D-4518-8FAD-1882B9671546}" type="datetime1">
+              <a:rPr lang="en-US" smtClean="0"/>
+              <a:pPr/>
               <a:t>8/26/2018</a:t>
             </a:fld>
             <a:endParaRPr lang="en-US"/>
@@ -1813,11 +1851,6 @@
         </p:txBody>
       </p:sp>
     </p:spTree>
-    <p:extLst>
-      <p:ext uri="{BB962C8B-B14F-4D97-AF65-F5344CB8AC3E}">
-        <p14:creationId xmlns:p14="http://schemas.microsoft.com/office/powerpoint/2010/main" val="699962269"/>
-      </p:ext>
-    </p:extLst>
   </p:cSld>
   <p:clrMapOvr>
     <a:masterClrMapping/>
@@ -1852,36 +1885,42 @@
             <p:ph type="title"/>
           </p:nvPr>
         </p:nvSpPr>
+        <p:spPr>
+          <a:xfrm>
+            <a:off x="609600" y="274638"/>
+            <a:ext cx="7924800" cy="1143000"/>
+          </a:xfrm>
+        </p:spPr>
+        <p:txBody>
+          <a:bodyPr/>
+          <a:lstStyle/>
+          <a:p>
+            <a:r>
+              <a:rPr lang="en-US" smtClean="0"/>
+              <a:t>Click to edit Master title style</a:t>
+            </a:r>
+            <a:endParaRPr lang="en-US" dirty="0"/>
+          </a:p>
+        </p:txBody>
+      </p:sp>
+      <p:sp>
+        <p:nvSpPr>
+          <p:cNvPr id="3" name="Date Placeholder 2"/>
+          <p:cNvSpPr>
+            <a:spLocks noGrp="1"/>
+          </p:cNvSpPr>
+          <p:nvPr>
+            <p:ph type="dt" sz="half" idx="10"/>
+          </p:nvPr>
+        </p:nvSpPr>
         <p:spPr/>
         <p:txBody>
           <a:bodyPr/>
           <a:lstStyle/>
           <a:p>
-            <a:r>
-              <a:rPr lang="en-US" smtClean="0"/>
-              <a:t>Click to edit Master title style</a:t>
-            </a:r>
-            <a:endParaRPr lang="en-US"/>
-          </a:p>
-        </p:txBody>
-      </p:sp>
-      <p:sp>
-        <p:nvSpPr>
-          <p:cNvPr id="3" name="Date Placeholder 2"/>
-          <p:cNvSpPr>
-            <a:spLocks noGrp="1"/>
-          </p:cNvSpPr>
-          <p:nvPr>
-            <p:ph type="dt" sz="half" idx="10"/>
-          </p:nvPr>
-        </p:nvSpPr>
-        <p:spPr/>
-        <p:txBody>
-          <a:bodyPr/>
-          <a:lstStyle/>
-          <a:p>
-            <a:fld id="{445E6F58-B168-42D3-B0F1-E5314F54A3DC}" type="datetimeFigureOut">
-              <a:rPr lang="en-US" smtClean="0"/>
+            <a:fld id="{465FFBFE-5C08-4E0E-AF38-FB925F0B4D71}" type="datetime1">
+              <a:rPr lang="en-US" smtClean="0"/>
+              <a:pPr/>
               <a:t>8/26/2018</a:t>
             </a:fld>
             <a:endParaRPr lang="en-US"/>
@@ -1931,11 +1970,6 @@
         </p:txBody>
       </p:sp>
     </p:spTree>
-    <p:extLst>
-      <p:ext uri="{BB962C8B-B14F-4D97-AF65-F5344CB8AC3E}">
-        <p14:creationId xmlns:p14="http://schemas.microsoft.com/office/powerpoint/2010/main" val="1835433695"/>
-      </p:ext>
-    </p:extLst>
   </p:cSld>
   <p:clrMapOvr>
     <a:masterClrMapping/>
@@ -1975,11 +2009,12 @@
           <a:bodyPr/>
           <a:lstStyle/>
           <a:p>
-            <a:fld id="{445E6F58-B168-42D3-B0F1-E5314F54A3DC}" type="datetimeFigureOut">
-              <a:rPr lang="en-US" smtClean="0"/>
+            <a:fld id="{3823242C-D747-4ADD-80D8-99421268E3A8}" type="datetime1">
+              <a:rPr lang="en-US" smtClean="0"/>
+              <a:pPr/>
               <a:t>8/26/2018</a:t>
             </a:fld>
-            <a:endParaRPr lang="en-US"/>
+            <a:endParaRPr lang="en-US" dirty="0"/>
           </a:p>
         </p:txBody>
       </p:sp>
@@ -2026,11 +2061,6 @@
         </p:txBody>
       </p:sp>
     </p:spTree>
-    <p:extLst>
-      <p:ext uri="{BB962C8B-B14F-4D97-AF65-F5344CB8AC3E}">
-        <p14:creationId xmlns:p14="http://schemas.microsoft.com/office/powerpoint/2010/main" val="2253472535"/>
-      </p:ext>
-    </p:extLst>
   </p:cSld>
   <p:clrMapOvr>
     <a:masterClrMapping/>
@@ -2057,25 +2087,86 @@
       </p:grpSpPr>
       <p:sp>
         <p:nvSpPr>
-          <p:cNvPr id="2" name="Title 1"/>
-          <p:cNvSpPr>
-            <a:spLocks noGrp="1"/>
-          </p:cNvSpPr>
-          <p:nvPr>
-            <p:ph type="title"/>
+          <p:cNvPr id="9" name="Content Placeholder 8"/>
+          <p:cNvSpPr>
+            <a:spLocks noGrp="1"/>
+          </p:cNvSpPr>
+          <p:nvPr>
+            <p:ph sz="quarter" idx="13"/>
           </p:nvPr>
         </p:nvSpPr>
         <p:spPr>
           <a:xfrm>
-            <a:off x="457200" y="273050"/>
-            <a:ext cx="3008313" cy="1162050"/>
+            <a:off x="3962400" y="1447800"/>
+            <a:ext cx="4648200" cy="4267200"/>
+          </a:xfrm>
+        </p:spPr>
+        <p:txBody>
+          <a:bodyPr/>
+          <a:lstStyle/>
+          <a:p>
+            <a:pPr lvl="0"/>
+            <a:r>
+              <a:rPr lang="en-US" smtClean="0"/>
+              <a:t>Click to edit Master text styles</a:t>
+            </a:r>
+          </a:p>
+          <a:p>
+            <a:pPr lvl="1"/>
+            <a:r>
+              <a:rPr lang="en-US" smtClean="0"/>
+              <a:t>Second level</a:t>
+            </a:r>
+          </a:p>
+          <a:p>
+            <a:pPr lvl="2"/>
+            <a:r>
+              <a:rPr lang="en-US" smtClean="0"/>
+              <a:t>Third level</a:t>
+            </a:r>
+          </a:p>
+          <a:p>
+            <a:pPr lvl="3"/>
+            <a:r>
+              <a:rPr lang="en-US" smtClean="0"/>
+              <a:t>Fourth level</a:t>
+            </a:r>
+          </a:p>
+          <a:p>
+            <a:pPr lvl="4"/>
+            <a:r>
+              <a:rPr lang="en-US" smtClean="0"/>
+              <a:t>Fifth level</a:t>
+            </a:r>
+            <a:endParaRPr lang="en-US" dirty="0"/>
+          </a:p>
+        </p:txBody>
+      </p:sp>
+      <p:sp>
+        <p:nvSpPr>
+          <p:cNvPr id="2" name="Title 1"/>
+          <p:cNvSpPr>
+            <a:spLocks noGrp="1"/>
+          </p:cNvSpPr>
+          <p:nvPr>
+            <p:ph type="title"/>
+          </p:nvPr>
+        </p:nvSpPr>
+        <p:spPr>
+          <a:xfrm>
+            <a:off x="612648" y="1447800"/>
+            <a:ext cx="2971800" cy="1097280"/>
           </a:xfrm>
         </p:spPr>
         <p:txBody>
           <a:bodyPr anchor="b"/>
           <a:lstStyle>
             <a:lvl1pPr algn="l">
-              <a:defRPr sz="2000" b="1"/>
+              <a:defRPr sz="1800" b="0" i="0" cap="none" baseline="0">
+                <a:solidFill>
+                  <a:schemeClr val="tx2"/>
+                </a:solidFill>
+              </a:defRPr>
             </a:lvl1pPr>
           </a:lstStyle>
           <a:p>
@@ -2083,113 +2174,30 @@
               <a:rPr lang="en-US" smtClean="0"/>
               <a:t>Click to edit Master title style</a:t>
             </a:r>
-            <a:endParaRPr lang="en-US"/>
-          </a:p>
-        </p:txBody>
-      </p:sp>
-      <p:sp>
-        <p:nvSpPr>
-          <p:cNvPr id="3" name="Content Placeholder 2"/>
-          <p:cNvSpPr>
-            <a:spLocks noGrp="1"/>
-          </p:cNvSpPr>
-          <p:nvPr>
-            <p:ph idx="1"/>
+            <a:endParaRPr lang="en-US" dirty="0"/>
+          </a:p>
+        </p:txBody>
+      </p:sp>
+      <p:sp>
+        <p:nvSpPr>
+          <p:cNvPr id="4" name="Text Placeholder 3"/>
+          <p:cNvSpPr>
+            <a:spLocks noGrp="1"/>
+          </p:cNvSpPr>
+          <p:nvPr>
+            <p:ph type="body" sz="half" idx="2"/>
           </p:nvPr>
         </p:nvSpPr>
         <p:spPr>
           <a:xfrm>
-            <a:off x="3575050" y="273050"/>
-            <a:ext cx="5111750" cy="5853113"/>
+            <a:off x="612648" y="2547891"/>
+            <a:ext cx="2971800" cy="3167109"/>
           </a:xfrm>
         </p:spPr>
         <p:txBody>
-          <a:bodyPr/>
-          <a:lstStyle>
-            <a:lvl1pPr>
-              <a:defRPr sz="3200"/>
-            </a:lvl1pPr>
-            <a:lvl2pPr>
-              <a:defRPr sz="2800"/>
-            </a:lvl2pPr>
-            <a:lvl3pPr>
-              <a:defRPr sz="2400"/>
-            </a:lvl3pPr>
-            <a:lvl4pPr>
-              <a:defRPr sz="2000"/>
-            </a:lvl4pPr>
-            <a:lvl5pPr>
-              <a:defRPr sz="2000"/>
-            </a:lvl5pPr>
-            <a:lvl6pPr>
-              <a:defRPr sz="2000"/>
-            </a:lvl6pPr>
-            <a:lvl7pPr>
-              <a:defRPr sz="2000"/>
-            </a:lvl7pPr>
-            <a:lvl8pPr>
-              <a:defRPr sz="2000"/>
-            </a:lvl8pPr>
-            <a:lvl9pPr>
-              <a:defRPr sz="2000"/>
-            </a:lvl9pPr>
-          </a:lstStyle>
-          <a:p>
-            <a:pPr lvl="0"/>
-            <a:r>
-              <a:rPr lang="en-US" smtClean="0"/>
-              <a:t>Click to edit Master text styles</a:t>
-            </a:r>
-          </a:p>
-          <a:p>
-            <a:pPr lvl="1"/>
-            <a:r>
-              <a:rPr lang="en-US" smtClean="0"/>
-              <a:t>Second level</a:t>
-            </a:r>
-          </a:p>
-          <a:p>
-            <a:pPr lvl="2"/>
-            <a:r>
-              <a:rPr lang="en-US" smtClean="0"/>
-              <a:t>Third level</a:t>
-            </a:r>
-          </a:p>
-          <a:p>
-            <a:pPr lvl="3"/>
-            <a:r>
-              <a:rPr lang="en-US" smtClean="0"/>
-              <a:t>Fourth level</a:t>
-            </a:r>
-          </a:p>
-          <a:p>
-            <a:pPr lvl="4"/>
-            <a:r>
-              <a:rPr lang="en-US" smtClean="0"/>
-              <a:t>Fifth level</a:t>
-            </a:r>
-            <a:endParaRPr lang="en-US"/>
-          </a:p>
-        </p:txBody>
-      </p:sp>
-      <p:sp>
-        <p:nvSpPr>
-          <p:cNvPr id="4" name="Text Placeholder 3"/>
-          <p:cNvSpPr>
-            <a:spLocks noGrp="1"/>
-          </p:cNvSpPr>
-          <p:nvPr>
-            <p:ph type="body" sz="half" idx="2"/>
-          </p:nvPr>
-        </p:nvSpPr>
-        <p:spPr>
-          <a:xfrm>
-            <a:off x="457200" y="1435100"/>
-            <a:ext cx="3008313" cy="4691063"/>
-          </a:xfrm>
-        </p:spPr>
-        <p:txBody>
-          <a:bodyPr/>
+          <a:bodyPr tIns="9144">
+            <a:normAutofit/>
+          </a:bodyPr>
           <a:lstStyle>
             <a:lvl1pPr marL="0" indent="0">
               <a:buNone/>
@@ -2252,8 +2260,9 @@
           <a:bodyPr/>
           <a:lstStyle/>
           <a:p>
-            <a:fld id="{445E6F58-B168-42D3-B0F1-E5314F54A3DC}" type="datetimeFigureOut">
-              <a:rPr lang="en-US" smtClean="0"/>
+            <a:fld id="{06E82007-CDD1-4BCF-B9F4-9D458EFEEFE1}" type="datetime1">
+              <a:rPr lang="en-US" smtClean="0"/>
+              <a:pPr/>
               <a:t>8/26/2018</a:t>
             </a:fld>
             <a:endParaRPr lang="en-US"/>
@@ -2303,11 +2312,6 @@
         </p:txBody>
       </p:sp>
     </p:spTree>
-    <p:extLst>
-      <p:ext uri="{BB962C8B-B14F-4D97-AF65-F5344CB8AC3E}">
-        <p14:creationId xmlns:p14="http://schemas.microsoft.com/office/powerpoint/2010/main" val="1810172312"/>
-      </p:ext>
-    </p:extLst>
   </p:cSld>
   <p:clrMapOvr>
     <a:masterClrMapping/>
@@ -2316,7 +2320,7 @@
 </file>
 
 <file path=ppt/slideLayouts/slideLayout9.xml><?xml version="1.0" encoding="utf-8"?>
-<p:sldLayout xmlns:a="http://schemas.openxmlformats.org/drawingml/2006/main" xmlns:r="http://schemas.openxmlformats.org/officeDocument/2006/relationships" xmlns:p="http://schemas.openxmlformats.org/presentationml/2006/main" type="picTx" preserve="1">
+<p:sldLayout xmlns:a="http://schemas.openxmlformats.org/drawingml/2006/main" xmlns:r="http://schemas.openxmlformats.org/officeDocument/2006/relationships" xmlns:p="http://schemas.openxmlformats.org/presentationml/2006/main" showMasterSp="0" type="picTx" preserve="1">
   <p:cSld name="Picture with Caption">
     <p:spTree>
       <p:nvGrpSpPr>
@@ -2332,27 +2336,55 @@
           <a:chExt cx="0" cy="0"/>
         </a:xfrm>
       </p:grpSpPr>
-      <p:sp>
-        <p:nvSpPr>
-          <p:cNvPr id="2" name="Title 1"/>
-          <p:cNvSpPr>
-            <a:spLocks noGrp="1"/>
-          </p:cNvSpPr>
-          <p:nvPr>
-            <p:ph type="title"/>
-          </p:nvPr>
-        </p:nvSpPr>
+      <p:pic>
+        <p:nvPicPr>
+          <p:cNvPr id="11" name="Picture 10" descr="horizon.png"/>
+          <p:cNvPicPr>
+            <a:picLocks noChangeAspect="1"/>
+          </p:cNvPicPr>
+          <p:nvPr/>
+        </p:nvPicPr>
+        <p:blipFill>
+          <a:blip r:embed="rId2" cstate="print"/>
+          <a:stretch>
+            <a:fillRect/>
+          </a:stretch>
+        </p:blipFill>
         <p:spPr>
           <a:xfrm>
-            <a:off x="1792288" y="4800600"/>
-            <a:ext cx="5486400" cy="566738"/>
+            <a:off x="0" y="0"/>
+            <a:ext cx="9144000" cy="6858000"/>
+          </a:xfrm>
+          <a:prstGeom prst="rect">
+            <a:avLst/>
+          </a:prstGeom>
+        </p:spPr>
+      </p:pic>
+      <p:sp>
+        <p:nvSpPr>
+          <p:cNvPr id="2" name="Title 1"/>
+          <p:cNvSpPr>
+            <a:spLocks noGrp="1"/>
+          </p:cNvSpPr>
+          <p:nvPr>
+            <p:ph type="title"/>
+          </p:nvPr>
+        </p:nvSpPr>
+        <p:spPr>
+          <a:xfrm>
+            <a:off x="609600" y="1447800"/>
+            <a:ext cx="2971800" cy="1097280"/>
           </a:xfrm>
         </p:spPr>
         <p:txBody>
           <a:bodyPr anchor="b"/>
           <a:lstStyle>
             <a:lvl1pPr algn="l">
-              <a:defRPr sz="2000" b="1"/>
+              <a:defRPr sz="1800" b="0" i="0" cap="none" baseline="0">
+                <a:solidFill>
+                  <a:schemeClr val="tx2"/>
+                </a:solidFill>
+              </a:defRPr>
             </a:lvl1pPr>
           </a:lstStyle>
           <a:p>
@@ -2360,7 +2392,7 @@
               <a:rPr lang="en-US" smtClean="0"/>
               <a:t>Click to edit Master title style</a:t>
             </a:r>
-            <a:endParaRPr lang="en-US"/>
+            <a:endParaRPr lang="en-US" dirty="0"/>
           </a:p>
         </p:txBody>
       </p:sp>
@@ -2376,16 +2408,250 @@
         </p:nvSpPr>
         <p:spPr>
           <a:xfrm>
-            <a:off x="1792288" y="612775"/>
-            <a:ext cx="5486400" cy="4114800"/>
+            <a:off x="4657344" y="1447800"/>
+            <a:ext cx="3419856" cy="3474720"/>
           </a:xfrm>
+          <a:custGeom>
+            <a:avLst/>
+            <a:gdLst>
+              <a:gd name="connsiteX0" fmla="*/ 0 w 3419856"/>
+              <a:gd name="connsiteY0" fmla="*/ 74450 h 3429000"/>
+              <a:gd name="connsiteX1" fmla="*/ 21806 w 3419856"/>
+              <a:gd name="connsiteY1" fmla="*/ 21806 h 3429000"/>
+              <a:gd name="connsiteX2" fmla="*/ 74450 w 3419856"/>
+              <a:gd name="connsiteY2" fmla="*/ 0 h 3429000"/>
+              <a:gd name="connsiteX3" fmla="*/ 3345406 w 3419856"/>
+              <a:gd name="connsiteY3" fmla="*/ 0 h 3429000"/>
+              <a:gd name="connsiteX4" fmla="*/ 3398050 w 3419856"/>
+              <a:gd name="connsiteY4" fmla="*/ 21806 h 3429000"/>
+              <a:gd name="connsiteX5" fmla="*/ 3419856 w 3419856"/>
+              <a:gd name="connsiteY5" fmla="*/ 74450 h 3429000"/>
+              <a:gd name="connsiteX6" fmla="*/ 3419856 w 3419856"/>
+              <a:gd name="connsiteY6" fmla="*/ 3354550 h 3429000"/>
+              <a:gd name="connsiteX7" fmla="*/ 3398050 w 3419856"/>
+              <a:gd name="connsiteY7" fmla="*/ 3407194 h 3429000"/>
+              <a:gd name="connsiteX8" fmla="*/ 3345406 w 3419856"/>
+              <a:gd name="connsiteY8" fmla="*/ 3429000 h 3429000"/>
+              <a:gd name="connsiteX9" fmla="*/ 74450 w 3419856"/>
+              <a:gd name="connsiteY9" fmla="*/ 3429000 h 3429000"/>
+              <a:gd name="connsiteX10" fmla="*/ 21806 w 3419856"/>
+              <a:gd name="connsiteY10" fmla="*/ 3407194 h 3429000"/>
+              <a:gd name="connsiteX11" fmla="*/ 0 w 3419856"/>
+              <a:gd name="connsiteY11" fmla="*/ 3354550 h 3429000"/>
+              <a:gd name="connsiteX12" fmla="*/ 0 w 3419856"/>
+              <a:gd name="connsiteY12" fmla="*/ 74450 h 3429000"/>
+              <a:gd name="connsiteX0" fmla="*/ 0 w 3419856"/>
+              <a:gd name="connsiteY0" fmla="*/ 74450 h 3429000"/>
+              <a:gd name="connsiteX1" fmla="*/ 21806 w 3419856"/>
+              <a:gd name="connsiteY1" fmla="*/ 21806 h 3429000"/>
+              <a:gd name="connsiteX2" fmla="*/ 74450 w 3419856"/>
+              <a:gd name="connsiteY2" fmla="*/ 0 h 3429000"/>
+              <a:gd name="connsiteX3" fmla="*/ 3345406 w 3419856"/>
+              <a:gd name="connsiteY3" fmla="*/ 0 h 3429000"/>
+              <a:gd name="connsiteX4" fmla="*/ 3398050 w 3419856"/>
+              <a:gd name="connsiteY4" fmla="*/ 21806 h 3429000"/>
+              <a:gd name="connsiteX5" fmla="*/ 3419856 w 3419856"/>
+              <a:gd name="connsiteY5" fmla="*/ 74450 h 3429000"/>
+              <a:gd name="connsiteX6" fmla="*/ 3419856 w 3419856"/>
+              <a:gd name="connsiteY6" fmla="*/ 3354550 h 3429000"/>
+              <a:gd name="connsiteX7" fmla="*/ 3398050 w 3419856"/>
+              <a:gd name="connsiteY7" fmla="*/ 3407194 h 3429000"/>
+              <a:gd name="connsiteX8" fmla="*/ 3345406 w 3419856"/>
+              <a:gd name="connsiteY8" fmla="*/ 3429000 h 3429000"/>
+              <a:gd name="connsiteX9" fmla="*/ 21806 w 3419856"/>
+              <a:gd name="connsiteY9" fmla="*/ 3407194 h 3429000"/>
+              <a:gd name="connsiteX10" fmla="*/ 0 w 3419856"/>
+              <a:gd name="connsiteY10" fmla="*/ 3354550 h 3429000"/>
+              <a:gd name="connsiteX11" fmla="*/ 0 w 3419856"/>
+              <a:gd name="connsiteY11" fmla="*/ 74450 h 3429000"/>
+              <a:gd name="connsiteX0" fmla="*/ 0 w 3964392"/>
+              <a:gd name="connsiteY0" fmla="*/ 74450 h 3415968"/>
+              <a:gd name="connsiteX1" fmla="*/ 21806 w 3964392"/>
+              <a:gd name="connsiteY1" fmla="*/ 21806 h 3415968"/>
+              <a:gd name="connsiteX2" fmla="*/ 74450 w 3964392"/>
+              <a:gd name="connsiteY2" fmla="*/ 0 h 3415968"/>
+              <a:gd name="connsiteX3" fmla="*/ 3345406 w 3964392"/>
+              <a:gd name="connsiteY3" fmla="*/ 0 h 3415968"/>
+              <a:gd name="connsiteX4" fmla="*/ 3398050 w 3964392"/>
+              <a:gd name="connsiteY4" fmla="*/ 21806 h 3415968"/>
+              <a:gd name="connsiteX5" fmla="*/ 3419856 w 3964392"/>
+              <a:gd name="connsiteY5" fmla="*/ 74450 h 3415968"/>
+              <a:gd name="connsiteX6" fmla="*/ 3419856 w 3964392"/>
+              <a:gd name="connsiteY6" fmla="*/ 3354550 h 3415968"/>
+              <a:gd name="connsiteX7" fmla="*/ 3398050 w 3964392"/>
+              <a:gd name="connsiteY7" fmla="*/ 3407194 h 3415968"/>
+              <a:gd name="connsiteX8" fmla="*/ 21806 w 3964392"/>
+              <a:gd name="connsiteY8" fmla="*/ 3407194 h 3415968"/>
+              <a:gd name="connsiteX9" fmla="*/ 0 w 3964392"/>
+              <a:gd name="connsiteY9" fmla="*/ 3354550 h 3415968"/>
+              <a:gd name="connsiteX10" fmla="*/ 0 w 3964392"/>
+              <a:gd name="connsiteY10" fmla="*/ 74450 h 3415968"/>
+              <a:gd name="connsiteX0" fmla="*/ 0 w 3964392"/>
+              <a:gd name="connsiteY0" fmla="*/ 74450 h 3415968"/>
+              <a:gd name="connsiteX1" fmla="*/ 21806 w 3964392"/>
+              <a:gd name="connsiteY1" fmla="*/ 21806 h 3415968"/>
+              <a:gd name="connsiteX2" fmla="*/ 74450 w 3964392"/>
+              <a:gd name="connsiteY2" fmla="*/ 0 h 3415968"/>
+              <a:gd name="connsiteX3" fmla="*/ 3345406 w 3964392"/>
+              <a:gd name="connsiteY3" fmla="*/ 0 h 3415968"/>
+              <a:gd name="connsiteX4" fmla="*/ 3398050 w 3964392"/>
+              <a:gd name="connsiteY4" fmla="*/ 21806 h 3415968"/>
+              <a:gd name="connsiteX5" fmla="*/ 3419856 w 3964392"/>
+              <a:gd name="connsiteY5" fmla="*/ 74450 h 3415968"/>
+              <a:gd name="connsiteX6" fmla="*/ 3419856 w 3964392"/>
+              <a:gd name="connsiteY6" fmla="*/ 3354550 h 3415968"/>
+              <a:gd name="connsiteX7" fmla="*/ 3398050 w 3964392"/>
+              <a:gd name="connsiteY7" fmla="*/ 3407194 h 3415968"/>
+              <a:gd name="connsiteX8" fmla="*/ 21806 w 3964392"/>
+              <a:gd name="connsiteY8" fmla="*/ 3407194 h 3415968"/>
+              <a:gd name="connsiteX9" fmla="*/ 0 w 3964392"/>
+              <a:gd name="connsiteY9" fmla="*/ 3354550 h 3415968"/>
+              <a:gd name="connsiteX10" fmla="*/ 0 w 3964392"/>
+              <a:gd name="connsiteY10" fmla="*/ 74450 h 3415968"/>
+              <a:gd name="connsiteX0" fmla="*/ 0 w 3968026"/>
+              <a:gd name="connsiteY0" fmla="*/ 74450 h 3910007"/>
+              <a:gd name="connsiteX1" fmla="*/ 21806 w 3968026"/>
+              <a:gd name="connsiteY1" fmla="*/ 21806 h 3910007"/>
+              <a:gd name="connsiteX2" fmla="*/ 74450 w 3968026"/>
+              <a:gd name="connsiteY2" fmla="*/ 0 h 3910007"/>
+              <a:gd name="connsiteX3" fmla="*/ 3345406 w 3968026"/>
+              <a:gd name="connsiteY3" fmla="*/ 0 h 3910007"/>
+              <a:gd name="connsiteX4" fmla="*/ 3398050 w 3968026"/>
+              <a:gd name="connsiteY4" fmla="*/ 21806 h 3910007"/>
+              <a:gd name="connsiteX5" fmla="*/ 3419856 w 3968026"/>
+              <a:gd name="connsiteY5" fmla="*/ 74450 h 3910007"/>
+              <a:gd name="connsiteX6" fmla="*/ 3419856 w 3968026"/>
+              <a:gd name="connsiteY6" fmla="*/ 3354550 h 3910007"/>
+              <a:gd name="connsiteX7" fmla="*/ 3398050 w 3968026"/>
+              <a:gd name="connsiteY7" fmla="*/ 3407194 h 3910007"/>
+              <a:gd name="connsiteX8" fmla="*/ 0 w 3968026"/>
+              <a:gd name="connsiteY8" fmla="*/ 3354550 h 3910007"/>
+              <a:gd name="connsiteX9" fmla="*/ 0 w 3968026"/>
+              <a:gd name="connsiteY9" fmla="*/ 74450 h 3910007"/>
+              <a:gd name="connsiteX0" fmla="*/ 0 w 3419856"/>
+              <a:gd name="connsiteY0" fmla="*/ 74450 h 3901233"/>
+              <a:gd name="connsiteX1" fmla="*/ 21806 w 3419856"/>
+              <a:gd name="connsiteY1" fmla="*/ 21806 h 3901233"/>
+              <a:gd name="connsiteX2" fmla="*/ 74450 w 3419856"/>
+              <a:gd name="connsiteY2" fmla="*/ 0 h 3901233"/>
+              <a:gd name="connsiteX3" fmla="*/ 3345406 w 3419856"/>
+              <a:gd name="connsiteY3" fmla="*/ 0 h 3901233"/>
+              <a:gd name="connsiteX4" fmla="*/ 3398050 w 3419856"/>
+              <a:gd name="connsiteY4" fmla="*/ 21806 h 3901233"/>
+              <a:gd name="connsiteX5" fmla="*/ 3419856 w 3419856"/>
+              <a:gd name="connsiteY5" fmla="*/ 74450 h 3901233"/>
+              <a:gd name="connsiteX6" fmla="*/ 3419856 w 3419856"/>
+              <a:gd name="connsiteY6" fmla="*/ 3354550 h 3901233"/>
+              <a:gd name="connsiteX7" fmla="*/ 0 w 3419856"/>
+              <a:gd name="connsiteY7" fmla="*/ 3354550 h 3901233"/>
+              <a:gd name="connsiteX8" fmla="*/ 0 w 3419856"/>
+              <a:gd name="connsiteY8" fmla="*/ 74450 h 3901233"/>
+              <a:gd name="connsiteX0" fmla="*/ 0 w 3419856"/>
+              <a:gd name="connsiteY0" fmla="*/ 74450 h 3354550"/>
+              <a:gd name="connsiteX1" fmla="*/ 21806 w 3419856"/>
+              <a:gd name="connsiteY1" fmla="*/ 21806 h 3354550"/>
+              <a:gd name="connsiteX2" fmla="*/ 74450 w 3419856"/>
+              <a:gd name="connsiteY2" fmla="*/ 0 h 3354550"/>
+              <a:gd name="connsiteX3" fmla="*/ 3345406 w 3419856"/>
+              <a:gd name="connsiteY3" fmla="*/ 0 h 3354550"/>
+              <a:gd name="connsiteX4" fmla="*/ 3398050 w 3419856"/>
+              <a:gd name="connsiteY4" fmla="*/ 21806 h 3354550"/>
+              <a:gd name="connsiteX5" fmla="*/ 3419856 w 3419856"/>
+              <a:gd name="connsiteY5" fmla="*/ 74450 h 3354550"/>
+              <a:gd name="connsiteX6" fmla="*/ 3419856 w 3419856"/>
+              <a:gd name="connsiteY6" fmla="*/ 3354550 h 3354550"/>
+              <a:gd name="connsiteX7" fmla="*/ 0 w 3419856"/>
+              <a:gd name="connsiteY7" fmla="*/ 3354550 h 3354550"/>
+              <a:gd name="connsiteX8" fmla="*/ 0 w 3419856"/>
+              <a:gd name="connsiteY8" fmla="*/ 74450 h 3354550"/>
+            </a:gdLst>
+            <a:ahLst/>
+            <a:cxnLst>
+              <a:cxn ang="0">
+                <a:pos x="connsiteX0" y="connsiteY0"/>
+              </a:cxn>
+              <a:cxn ang="0">
+                <a:pos x="connsiteX1" y="connsiteY1"/>
+              </a:cxn>
+              <a:cxn ang="0">
+                <a:pos x="connsiteX2" y="connsiteY2"/>
+              </a:cxn>
+              <a:cxn ang="0">
+                <a:pos x="connsiteX3" y="connsiteY3"/>
+              </a:cxn>
+              <a:cxn ang="0">
+                <a:pos x="connsiteX4" y="connsiteY4"/>
+              </a:cxn>
+              <a:cxn ang="0">
+                <a:pos x="connsiteX5" y="connsiteY5"/>
+              </a:cxn>
+              <a:cxn ang="0">
+                <a:pos x="connsiteX6" y="connsiteY6"/>
+              </a:cxn>
+              <a:cxn ang="0">
+                <a:pos x="connsiteX7" y="connsiteY7"/>
+              </a:cxn>
+              <a:cxn ang="0">
+                <a:pos x="connsiteX8" y="connsiteY8"/>
+              </a:cxn>
+            </a:cxnLst>
+            <a:rect l="l" t="t" r="r" b="b"/>
+            <a:pathLst>
+              <a:path w="3419856" h="3354550">
+                <a:moveTo>
+                  <a:pt x="0" y="74450"/>
+                </a:moveTo>
+                <a:cubicBezTo>
+                  <a:pt x="0" y="54705"/>
+                  <a:pt x="7844" y="35768"/>
+                  <a:pt x="21806" y="21806"/>
+                </a:cubicBezTo>
+                <a:cubicBezTo>
+                  <a:pt x="35768" y="7844"/>
+                  <a:pt x="54705" y="0"/>
+                  <a:pt x="74450" y="0"/>
+                </a:cubicBezTo>
+                <a:lnTo>
+                  <a:pt x="3345406" y="0"/>
+                </a:lnTo>
+                <a:cubicBezTo>
+                  <a:pt x="3365151" y="0"/>
+                  <a:pt x="3384088" y="7844"/>
+                  <a:pt x="3398050" y="21806"/>
+                </a:cubicBezTo>
+                <a:cubicBezTo>
+                  <a:pt x="3412012" y="35768"/>
+                  <a:pt x="3419856" y="54705"/>
+                  <a:pt x="3419856" y="74450"/>
+                </a:cubicBezTo>
+                <a:lnTo>
+                  <a:pt x="3419856" y="3354550"/>
+                </a:lnTo>
+                <a:lnTo>
+                  <a:pt x="0" y="3354550"/>
+                </a:lnTo>
+                <a:lnTo>
+                  <a:pt x="0" y="74450"/>
+                </a:lnTo>
+                <a:close/>
+              </a:path>
+            </a:pathLst>
+          </a:custGeom>
         </p:spPr>
         <p:txBody>
-          <a:bodyPr/>
+          <a:bodyPr>
+            <a:normAutofit/>
+          </a:bodyPr>
           <a:lstStyle>
-            <a:lvl1pPr marL="0" indent="0">
-              <a:buNone/>
-              <a:defRPr sz="3200"/>
+            <a:lvl1pPr marL="0" indent="0" algn="ctr">
+              <a:buNone/>
+              <a:defRPr sz="2000" baseline="0">
+                <a:solidFill>
+                  <a:schemeClr val="tx1">
+                    <a:lumMod val="65000"/>
+                  </a:schemeClr>
+                </a:solidFill>
+              </a:defRPr>
             </a:lvl1pPr>
             <a:lvl2pPr marL="457200" indent="0">
               <a:buNone/>
@@ -2421,7 +2687,11 @@
             </a:lvl9pPr>
           </a:lstStyle>
           <a:p>
-            <a:endParaRPr lang="en-US"/>
+            <a:r>
+              <a:rPr lang="en-US" smtClean="0"/>
+              <a:t>Click icon to add picture</a:t>
+            </a:r>
+            <a:endParaRPr lang="en-US" dirty="0"/>
           </a:p>
         </p:txBody>
       </p:sp>
@@ -2437,12 +2707,14 @@
         </p:nvSpPr>
         <p:spPr>
           <a:xfrm>
-            <a:off x="1792288" y="5367338"/>
-            <a:ext cx="5486400" cy="804862"/>
+            <a:off x="609600" y="2547890"/>
+            <a:ext cx="2971800" cy="2405109"/>
           </a:xfrm>
         </p:spPr>
         <p:txBody>
-          <a:bodyPr/>
+          <a:bodyPr tIns="9144">
+            <a:normAutofit/>
+          </a:bodyPr>
           <a:lstStyle>
             <a:lvl1pPr marL="0" indent="0">
               <a:buNone/>
@@ -2505,8 +2777,9 @@
           <a:bodyPr/>
           <a:lstStyle/>
           <a:p>
-            <a:fld id="{445E6F58-B168-42D3-B0F1-E5314F54A3DC}" type="datetimeFigureOut">
-              <a:rPr lang="en-US" smtClean="0"/>
+            <a:fld id="{34A4F265-CA88-4C30-A9AD-02E6A5184734}" type="datetime1">
+              <a:rPr lang="en-US" smtClean="0"/>
+              <a:pPr/>
               <a:t>8/26/2018</a:t>
             </a:fld>
             <a:endParaRPr lang="en-US"/>
@@ -2556,11 +2829,6 @@
         </p:txBody>
       </p:sp>
     </p:spTree>
-    <p:extLst>
-      <p:ext uri="{BB962C8B-B14F-4D97-AF65-F5344CB8AC3E}">
-        <p14:creationId xmlns:p14="http://schemas.microsoft.com/office/powerpoint/2010/main" val="2470804878"/>
-      </p:ext>
-    </p:extLst>
   </p:cSld>
   <p:clrMapOvr>
     <a:masterClrMapping/>
@@ -2572,7 +2840,7 @@
 <p:sldMaster xmlns:a="http://schemas.openxmlformats.org/drawingml/2006/main" xmlns:r="http://schemas.openxmlformats.org/officeDocument/2006/relationships" xmlns:p="http://schemas.openxmlformats.org/presentationml/2006/main">
   <p:cSld>
     <p:bg>
-      <p:bgRef idx="1001">
+      <p:bgRef idx="1002">
         <a:schemeClr val="bg1"/>
       </p:bgRef>
     </p:bg>
@@ -2590,139 +2858,162 @@
           <a:chExt cx="0" cy="0"/>
         </a:xfrm>
       </p:grpSpPr>
-      <p:sp>
-        <p:nvSpPr>
-          <p:cNvPr id="2" name="Title Placeholder 1"/>
-          <p:cNvSpPr>
-            <a:spLocks noGrp="1"/>
-          </p:cNvSpPr>
-          <p:nvPr>
-            <p:ph type="title"/>
-          </p:nvPr>
-        </p:nvSpPr>
+      <p:pic>
+        <p:nvPicPr>
+          <p:cNvPr id="7" name="Picture 6" descr="horizon.png"/>
+          <p:cNvPicPr>
+            <a:picLocks noChangeAspect="1"/>
+          </p:cNvPicPr>
+          <p:nvPr/>
+        </p:nvPicPr>
+        <p:blipFill>
+          <a:blip r:embed="rId13" cstate="print"/>
+          <a:stretch>
+            <a:fillRect/>
+          </a:stretch>
+        </p:blipFill>
         <p:spPr>
           <a:xfrm>
-            <a:off x="457200" y="274638"/>
-            <a:ext cx="8229600" cy="1143000"/>
+            <a:off x="0" y="0"/>
+            <a:ext cx="9144000" cy="6858000"/>
           </a:xfrm>
           <a:prstGeom prst="rect">
             <a:avLst/>
           </a:prstGeom>
         </p:spPr>
-        <p:txBody>
-          <a:bodyPr vert="horz" lIns="91440" tIns="45720" rIns="91440" bIns="45720" rtlCol="0" anchor="ctr">
-            <a:normAutofit/>
-          </a:bodyPr>
-          <a:lstStyle/>
-          <a:p>
-            <a:r>
-              <a:rPr lang="en-US" smtClean="0"/>
-              <a:t>Click to edit Master title style</a:t>
-            </a:r>
-            <a:endParaRPr lang="en-US"/>
-          </a:p>
-        </p:txBody>
-      </p:sp>
-      <p:sp>
-        <p:nvSpPr>
-          <p:cNvPr id="3" name="Text Placeholder 2"/>
-          <p:cNvSpPr>
-            <a:spLocks noGrp="1"/>
-          </p:cNvSpPr>
-          <p:nvPr>
-            <p:ph type="body" idx="1"/>
+      </p:pic>
+      <p:sp>
+        <p:nvSpPr>
+          <p:cNvPr id="2" name="Title Placeholder 1"/>
+          <p:cNvSpPr>
+            <a:spLocks noGrp="1"/>
+          </p:cNvSpPr>
+          <p:nvPr>
+            <p:ph type="title"/>
           </p:nvPr>
         </p:nvSpPr>
         <p:spPr>
           <a:xfrm>
-            <a:off x="457200" y="1600200"/>
-            <a:ext cx="8229600" cy="4525963"/>
+            <a:off x="609600" y="274638"/>
+            <a:ext cx="7924800" cy="1143000"/>
           </a:xfrm>
           <a:prstGeom prst="rect">
             <a:avLst/>
           </a:prstGeom>
         </p:spPr>
         <p:txBody>
-          <a:bodyPr vert="horz" lIns="91440" tIns="45720" rIns="91440" bIns="45720" rtlCol="0">
-            <a:normAutofit/>
+          <a:bodyPr vert="horz" lIns="91440" tIns="45720" rIns="91440" bIns="45720" rtlCol="0" anchor="b" anchorCtr="0">
+            <a:noAutofit/>
           </a:bodyPr>
           <a:lstStyle/>
           <a:p>
-            <a:pPr lvl="0"/>
-            <a:r>
-              <a:rPr lang="en-US" smtClean="0"/>
-              <a:t>Click to edit Master text styles</a:t>
-            </a:r>
-          </a:p>
-          <a:p>
-            <a:pPr lvl="1"/>
-            <a:r>
-              <a:rPr lang="en-US" smtClean="0"/>
-              <a:t>Second level</a:t>
-            </a:r>
-          </a:p>
-          <a:p>
-            <a:pPr lvl="2"/>
-            <a:r>
-              <a:rPr lang="en-US" smtClean="0"/>
-              <a:t>Third level</a:t>
-            </a:r>
-          </a:p>
-          <a:p>
-            <a:pPr lvl="3"/>
-            <a:r>
-              <a:rPr lang="en-US" smtClean="0"/>
-              <a:t>Fourth level</a:t>
-            </a:r>
-          </a:p>
-          <a:p>
-            <a:pPr lvl="4"/>
-            <a:r>
-              <a:rPr lang="en-US" smtClean="0"/>
-              <a:t>Fifth level</a:t>
-            </a:r>
-            <a:endParaRPr lang="en-US"/>
-          </a:p>
-        </p:txBody>
-      </p:sp>
-      <p:sp>
-        <p:nvSpPr>
-          <p:cNvPr id="4" name="Date Placeholder 3"/>
-          <p:cNvSpPr>
-            <a:spLocks noGrp="1"/>
-          </p:cNvSpPr>
-          <p:nvPr>
-            <p:ph type="dt" sz="half" idx="2"/>
+            <a:r>
+              <a:rPr lang="en-US" smtClean="0"/>
+              <a:t>Click to edit Master title style</a:t>
+            </a:r>
+            <a:endParaRPr lang="en-US" dirty="0"/>
+          </a:p>
+        </p:txBody>
+      </p:sp>
+      <p:sp>
+        <p:nvSpPr>
+          <p:cNvPr id="3" name="Text Placeholder 2"/>
+          <p:cNvSpPr>
+            <a:spLocks noGrp="1"/>
+          </p:cNvSpPr>
+          <p:nvPr>
+            <p:ph type="body" idx="1"/>
           </p:nvPr>
         </p:nvSpPr>
         <p:spPr>
           <a:xfrm>
-            <a:off x="457200" y="6356350"/>
-            <a:ext cx="2133600" cy="365125"/>
+            <a:off x="609600" y="1600200"/>
+            <a:ext cx="7924800" cy="4525963"/>
           </a:xfrm>
           <a:prstGeom prst="rect">
             <a:avLst/>
           </a:prstGeom>
         </p:spPr>
         <p:txBody>
+          <a:bodyPr vert="horz" lIns="91440" tIns="45720" rIns="91440" bIns="45720" rtlCol="0">
+            <a:normAutofit/>
+          </a:bodyPr>
+          <a:lstStyle/>
+          <a:p>
+            <a:pPr lvl="0"/>
+            <a:r>
+              <a:rPr lang="en-US" smtClean="0"/>
+              <a:t>Click to edit Master text styles</a:t>
+            </a:r>
+          </a:p>
+          <a:p>
+            <a:pPr lvl="1"/>
+            <a:r>
+              <a:rPr lang="en-US" smtClean="0"/>
+              <a:t>Second level</a:t>
+            </a:r>
+          </a:p>
+          <a:p>
+            <a:pPr lvl="2"/>
+            <a:r>
+              <a:rPr lang="en-US" smtClean="0"/>
+              <a:t>Third level</a:t>
+            </a:r>
+          </a:p>
+          <a:p>
+            <a:pPr lvl="3"/>
+            <a:r>
+              <a:rPr lang="en-US" smtClean="0"/>
+              <a:t>Fourth level</a:t>
+            </a:r>
+          </a:p>
+          <a:p>
+            <a:pPr lvl="4"/>
+            <a:r>
+              <a:rPr lang="en-US" smtClean="0"/>
+              <a:t>Fifth level</a:t>
+            </a:r>
+            <a:endParaRPr lang="en-US" dirty="0" smtClean="0"/>
+          </a:p>
+        </p:txBody>
+      </p:sp>
+      <p:sp>
+        <p:nvSpPr>
+          <p:cNvPr id="4" name="Date Placeholder 3"/>
+          <p:cNvSpPr>
+            <a:spLocks noGrp="1"/>
+          </p:cNvSpPr>
+          <p:nvPr>
+            <p:ph type="dt" sz="half" idx="2"/>
+          </p:nvPr>
+        </p:nvSpPr>
+        <p:spPr>
+          <a:xfrm>
+            <a:off x="5715000" y="6356350"/>
+            <a:ext cx="1524000" cy="365125"/>
+          </a:xfrm>
+          <a:prstGeom prst="rect">
+            <a:avLst/>
+          </a:prstGeom>
+        </p:spPr>
+        <p:txBody>
           <a:bodyPr vert="horz" lIns="91440" tIns="45720" rIns="91440" bIns="45720" rtlCol="0" anchor="ctr"/>
           <a:lstStyle>
-            <a:lvl1pPr algn="l">
-              <a:defRPr sz="1200">
+            <a:lvl1pPr algn="r">
+              <a:defRPr sz="1000" strike="noStrike" spc="60" baseline="0">
                 <a:solidFill>
-                  <a:schemeClr val="tx1">
-                    <a:tint val="75000"/>
-                  </a:schemeClr>
+                  <a:schemeClr val="tx1"/>
                 </a:solidFill>
               </a:defRPr>
             </a:lvl1pPr>
           </a:lstStyle>
           <a:p>
-            <a:fld id="{445E6F58-B168-42D3-B0F1-E5314F54A3DC}" type="datetimeFigureOut">
-              <a:rPr lang="en-US" smtClean="0"/>
+            <a:fld id="{3823242C-D747-4ADD-80D8-99421268E3A8}" type="datetime1">
+              <a:rPr lang="en-US" smtClean="0"/>
+              <a:pPr/>
               <a:t>8/26/2018</a:t>
             </a:fld>
-            <a:endParaRPr lang="en-US"/>
+            <a:endParaRPr lang="en-US" dirty="0"/>
           </a:p>
         </p:txBody>
       </p:sp>
@@ -2738,7 +3029,7 @@
         </p:nvSpPr>
         <p:spPr>
           <a:xfrm>
-            <a:off x="3124200" y="6356350"/>
+            <a:off x="609600" y="6356350"/>
             <a:ext cx="2895600" cy="365125"/>
           </a:xfrm>
           <a:prstGeom prst="rect">
@@ -2748,12 +3039,10 @@
         <p:txBody>
           <a:bodyPr vert="horz" lIns="91440" tIns="45720" rIns="91440" bIns="45720" rtlCol="0" anchor="ctr"/>
           <a:lstStyle>
-            <a:lvl1pPr algn="ctr">
-              <a:defRPr sz="1200">
+            <a:lvl1pPr algn="l">
+              <a:defRPr sz="1000" cap="all" spc="60" baseline="0">
                 <a:solidFill>
-                  <a:schemeClr val="tx1">
-                    <a:tint val="75000"/>
-                  </a:schemeClr>
+                  <a:schemeClr val="tx1"/>
                 </a:solidFill>
               </a:defRPr>
             </a:lvl1pPr>
@@ -2775,8 +3064,8 @@
         </p:nvSpPr>
         <p:spPr>
           <a:xfrm>
-            <a:off x="6553200" y="6356350"/>
-            <a:ext cx="2133600" cy="365125"/>
+            <a:off x="7543800" y="6356350"/>
+            <a:ext cx="990600" cy="365125"/>
           </a:xfrm>
           <a:prstGeom prst="rect">
             <a:avLst/>
@@ -2786,11 +3075,9 @@
           <a:bodyPr vert="horz" lIns="91440" tIns="45720" rIns="91440" bIns="45720" rtlCol="0" anchor="ctr"/>
           <a:lstStyle>
             <a:lvl1pPr algn="r">
-              <a:defRPr sz="1200">
+              <a:defRPr sz="1100" baseline="0">
                 <a:solidFill>
-                  <a:schemeClr val="tx1">
-                    <a:tint val="75000"/>
-                  </a:schemeClr>
+                  <a:schemeClr val="tx1"/>
                 </a:solidFill>
               </a:defRPr>
             </a:lvl1pPr>
@@ -2805,34 +3092,29 @@
         </p:txBody>
       </p:sp>
     </p:spTree>
-    <p:extLst>
-      <p:ext uri="{BB962C8B-B14F-4D97-AF65-F5344CB8AC3E}">
-        <p14:creationId xmlns:p14="http://schemas.microsoft.com/office/powerpoint/2010/main" val="3050418496"/>
-      </p:ext>
-    </p:extLst>
   </p:cSld>
-  <p:clrMap bg1="lt1" tx1="dk1" bg2="lt2" tx2="dk2" accent1="accent1" accent2="accent2" accent3="accent3" accent4="accent4" accent5="accent5" accent6="accent6" hlink="hlink" folHlink="folHlink"/>
+  <p:clrMap bg1="dk1" tx1="lt1" bg2="dk2" tx2="lt2" accent1="accent1" accent2="accent2" accent3="accent3" accent4="accent4" accent5="accent5" accent6="accent6" hlink="hlink" folHlink="folHlink"/>
   <p:sldLayoutIdLst>
-    <p:sldLayoutId id="2147483649" r:id="rId1"/>
-    <p:sldLayoutId id="2147483650" r:id="rId2"/>
-    <p:sldLayoutId id="2147483651" r:id="rId3"/>
-    <p:sldLayoutId id="2147483652" r:id="rId4"/>
-    <p:sldLayoutId id="2147483653" r:id="rId5"/>
-    <p:sldLayoutId id="2147483654" r:id="rId6"/>
-    <p:sldLayoutId id="2147483655" r:id="rId7"/>
-    <p:sldLayoutId id="2147483656" r:id="rId8"/>
-    <p:sldLayoutId id="2147483657" r:id="rId9"/>
-    <p:sldLayoutId id="2147483658" r:id="rId10"/>
-    <p:sldLayoutId id="2147483659" r:id="rId11"/>
+    <p:sldLayoutId id="2147483823" r:id="rId1"/>
+    <p:sldLayoutId id="2147483824" r:id="rId2"/>
+    <p:sldLayoutId id="2147483825" r:id="rId3"/>
+    <p:sldLayoutId id="2147483826" r:id="rId4"/>
+    <p:sldLayoutId id="2147483827" r:id="rId5"/>
+    <p:sldLayoutId id="2147483828" r:id="rId6"/>
+    <p:sldLayoutId id="2147483829" r:id="rId7"/>
+    <p:sldLayoutId id="2147483830" r:id="rId8"/>
+    <p:sldLayoutId id="2147483831" r:id="rId9"/>
+    <p:sldLayoutId id="2147483832" r:id="rId10"/>
+    <p:sldLayoutId id="2147483833" r:id="rId11"/>
   </p:sldLayoutIdLst>
   <p:txStyles>
     <p:titleStyle>
-      <a:lvl1pPr algn="ctr" defTabSz="914400" rtl="0" eaLnBrk="1" latinLnBrk="0" hangingPunct="1">
+      <a:lvl1pPr algn="l" defTabSz="914400" rtl="0" eaLnBrk="1" latinLnBrk="0" hangingPunct="1">
         <a:spcBef>
           <a:spcPct val="0"/>
         </a:spcBef>
         <a:buNone/>
-        <a:defRPr sz="4400" kern="1200">
+        <a:defRPr sz="3000" kern="1200" cap="all" spc="50" baseline="0">
           <a:solidFill>
             <a:schemeClr val="tx1"/>
           </a:solidFill>
@@ -2841,15 +3123,80 @@
           <a:cs typeface="+mj-cs"/>
         </a:defRPr>
       </a:lvl1pPr>
+      <a:lvl2pPr eaLnBrk="1" hangingPunct="1">
+        <a:defRPr>
+          <a:solidFill>
+            <a:schemeClr val="tx2"/>
+          </a:solidFill>
+        </a:defRPr>
+      </a:lvl2pPr>
+      <a:lvl3pPr eaLnBrk="1" hangingPunct="1">
+        <a:defRPr>
+          <a:solidFill>
+            <a:schemeClr val="tx2"/>
+          </a:solidFill>
+        </a:defRPr>
+      </a:lvl3pPr>
+      <a:lvl4pPr eaLnBrk="1" hangingPunct="1">
+        <a:defRPr>
+          <a:solidFill>
+            <a:schemeClr val="tx2"/>
+          </a:solidFill>
+        </a:defRPr>
+      </a:lvl4pPr>
+      <a:lvl5pPr eaLnBrk="1" hangingPunct="1">
+        <a:defRPr>
+          <a:solidFill>
+            <a:schemeClr val="tx2"/>
+          </a:solidFill>
+        </a:defRPr>
+      </a:lvl5pPr>
+      <a:lvl6pPr eaLnBrk="1" hangingPunct="1">
+        <a:defRPr>
+          <a:solidFill>
+            <a:schemeClr val="tx2"/>
+          </a:solidFill>
+        </a:defRPr>
+      </a:lvl6pPr>
+      <a:lvl7pPr eaLnBrk="1" hangingPunct="1">
+        <a:defRPr>
+          <a:solidFill>
+            <a:schemeClr val="tx2"/>
+          </a:solidFill>
+        </a:defRPr>
+      </a:lvl7pPr>
+      <a:lvl8pPr eaLnBrk="1" hangingPunct="1">
+        <a:defRPr>
+          <a:solidFill>
+            <a:schemeClr val="tx2"/>
+          </a:solidFill>
+        </a:defRPr>
+      </a:lvl8pPr>
+      <a:lvl9pPr eaLnBrk="1" hangingPunct="1">
+        <a:defRPr>
+          <a:solidFill>
+            <a:schemeClr val="tx2"/>
+          </a:solidFill>
+        </a:defRPr>
+      </a:lvl9pPr>
     </p:titleStyle>
     <p:bodyStyle>
       <a:lvl1pPr marL="342900" indent="-342900" algn="l" defTabSz="914400" rtl="0" eaLnBrk="1" latinLnBrk="0" hangingPunct="1">
+        <a:lnSpc>
+          <a:spcPct val="100000"/>
+        </a:lnSpc>
         <a:spcBef>
           <a:spcPct val="20000"/>
         </a:spcBef>
+        <a:spcAft>
+          <a:spcPts val="600"/>
+        </a:spcAft>
+        <a:buClr>
+          <a:schemeClr val="tx2"/>
+        </a:buClr>
         <a:buFont typeface="Arial" pitchFamily="34" charset="0"/>
         <a:buChar char="•"/>
-        <a:defRPr sz="3200" kern="1200">
+        <a:defRPr sz="1700" kern="1200" spc="30" baseline="0">
           <a:solidFill>
             <a:schemeClr val="tx1"/>
           </a:solidFill>
@@ -2859,12 +3206,21 @@
         </a:defRPr>
       </a:lvl1pPr>
       <a:lvl2pPr marL="742950" indent="-285750" algn="l" defTabSz="914400" rtl="0" eaLnBrk="1" latinLnBrk="0" hangingPunct="1">
+        <a:lnSpc>
+          <a:spcPct val="100000"/>
+        </a:lnSpc>
         <a:spcBef>
           <a:spcPct val="20000"/>
         </a:spcBef>
+        <a:spcAft>
+          <a:spcPts val="600"/>
+        </a:spcAft>
+        <a:buClr>
+          <a:schemeClr val="tx2"/>
+        </a:buClr>
         <a:buFont typeface="Arial" pitchFamily="34" charset="0"/>
-        <a:buChar char="–"/>
-        <a:defRPr sz="2800" kern="1200">
+        <a:buChar char="•"/>
+        <a:defRPr sz="1700" kern="1200" spc="30" baseline="0">
           <a:solidFill>
             <a:schemeClr val="tx1"/>
           </a:solidFill>
@@ -2874,12 +3230,21 @@
         </a:defRPr>
       </a:lvl2pPr>
       <a:lvl3pPr marL="1143000" indent="-228600" algn="l" defTabSz="914400" rtl="0" eaLnBrk="1" latinLnBrk="0" hangingPunct="1">
+        <a:lnSpc>
+          <a:spcPct val="100000"/>
+        </a:lnSpc>
         <a:spcBef>
           <a:spcPct val="20000"/>
         </a:spcBef>
+        <a:spcAft>
+          <a:spcPts val="600"/>
+        </a:spcAft>
+        <a:buClr>
+          <a:schemeClr val="tx2"/>
+        </a:buClr>
         <a:buFont typeface="Arial" pitchFamily="34" charset="0"/>
         <a:buChar char="•"/>
-        <a:defRPr sz="2400" kern="1200">
+        <a:defRPr sz="1700" kern="1200" spc="30" baseline="0">
           <a:solidFill>
             <a:schemeClr val="tx1"/>
           </a:solidFill>
@@ -2889,12 +3254,21 @@
         </a:defRPr>
       </a:lvl3pPr>
       <a:lvl4pPr marL="1600200" indent="-228600" algn="l" defTabSz="914400" rtl="0" eaLnBrk="1" latinLnBrk="0" hangingPunct="1">
+        <a:lnSpc>
+          <a:spcPct val="100000"/>
+        </a:lnSpc>
         <a:spcBef>
           <a:spcPct val="20000"/>
         </a:spcBef>
+        <a:spcAft>
+          <a:spcPts val="600"/>
+        </a:spcAft>
+        <a:buClr>
+          <a:schemeClr val="tx2"/>
+        </a:buClr>
         <a:buFont typeface="Arial" pitchFamily="34" charset="0"/>
-        <a:buChar char="–"/>
-        <a:defRPr sz="2000" kern="1200">
+        <a:buChar char="•"/>
+        <a:defRPr sz="1700" kern="1200" spc="30" baseline="0">
           <a:solidFill>
             <a:schemeClr val="tx1"/>
           </a:solidFill>
@@ -2904,12 +3278,21 @@
         </a:defRPr>
       </a:lvl4pPr>
       <a:lvl5pPr marL="2057400" indent="-228600" algn="l" defTabSz="914400" rtl="0" eaLnBrk="1" latinLnBrk="0" hangingPunct="1">
+        <a:lnSpc>
+          <a:spcPct val="100000"/>
+        </a:lnSpc>
         <a:spcBef>
           <a:spcPct val="20000"/>
         </a:spcBef>
+        <a:spcAft>
+          <a:spcPts val="600"/>
+        </a:spcAft>
+        <a:buClr>
+          <a:schemeClr val="tx2"/>
+        </a:buClr>
         <a:buFont typeface="Arial" pitchFamily="34" charset="0"/>
-        <a:buChar char="»"/>
-        <a:defRPr sz="2000" kern="1200">
+        <a:buChar char="•"/>
+        <a:defRPr sz="1700" kern="1200" spc="30" baseline="0">
           <a:solidFill>
             <a:schemeClr val="tx1"/>
           </a:solidFill>
@@ -2919,12 +3302,21 @@
         </a:defRPr>
       </a:lvl5pPr>
       <a:lvl6pPr marL="2514600" indent="-228600" algn="l" defTabSz="914400" rtl="0" eaLnBrk="1" latinLnBrk="0" hangingPunct="1">
+        <a:lnSpc>
+          <a:spcPct val="100000"/>
+        </a:lnSpc>
         <a:spcBef>
           <a:spcPct val="20000"/>
         </a:spcBef>
+        <a:spcAft>
+          <a:spcPts val="600"/>
+        </a:spcAft>
+        <a:buClr>
+          <a:schemeClr val="tx2"/>
+        </a:buClr>
         <a:buFont typeface="Arial" pitchFamily="34" charset="0"/>
         <a:buChar char="•"/>
-        <a:defRPr sz="2000" kern="1200">
+        <a:defRPr sz="1700" kern="1200">
           <a:solidFill>
             <a:schemeClr val="tx1"/>
           </a:solidFill>
@@ -2934,12 +3326,21 @@
         </a:defRPr>
       </a:lvl6pPr>
       <a:lvl7pPr marL="2971800" indent="-228600" algn="l" defTabSz="914400" rtl="0" eaLnBrk="1" latinLnBrk="0" hangingPunct="1">
+        <a:lnSpc>
+          <a:spcPct val="100000"/>
+        </a:lnSpc>
         <a:spcBef>
           <a:spcPct val="20000"/>
         </a:spcBef>
+        <a:spcAft>
+          <a:spcPts val="600"/>
+        </a:spcAft>
+        <a:buClr>
+          <a:schemeClr val="tx2"/>
+        </a:buClr>
         <a:buFont typeface="Arial" pitchFamily="34" charset="0"/>
         <a:buChar char="•"/>
-        <a:defRPr sz="2000" kern="1200">
+        <a:defRPr sz="1700" kern="1200">
           <a:solidFill>
             <a:schemeClr val="tx1"/>
           </a:solidFill>
@@ -2949,12 +3350,21 @@
         </a:defRPr>
       </a:lvl7pPr>
       <a:lvl8pPr marL="3429000" indent="-228600" algn="l" defTabSz="914400" rtl="0" eaLnBrk="1" latinLnBrk="0" hangingPunct="1">
+        <a:lnSpc>
+          <a:spcPct val="100000"/>
+        </a:lnSpc>
         <a:spcBef>
           <a:spcPct val="20000"/>
         </a:spcBef>
+        <a:spcAft>
+          <a:spcPts val="600"/>
+        </a:spcAft>
+        <a:buClr>
+          <a:schemeClr val="tx2"/>
+        </a:buClr>
         <a:buFont typeface="Arial" pitchFamily="34" charset="0"/>
         <a:buChar char="•"/>
-        <a:defRPr sz="2000" kern="1200">
+        <a:defRPr sz="1700" kern="1200">
           <a:solidFill>
             <a:schemeClr val="tx1"/>
           </a:solidFill>
@@ -2964,12 +3374,21 @@
         </a:defRPr>
       </a:lvl8pPr>
       <a:lvl9pPr marL="3886200" indent="-228600" algn="l" defTabSz="914400" rtl="0" eaLnBrk="1" latinLnBrk="0" hangingPunct="1">
+        <a:lnSpc>
+          <a:spcPct val="100000"/>
+        </a:lnSpc>
         <a:spcBef>
           <a:spcPct val="20000"/>
         </a:spcBef>
+        <a:spcAft>
+          <a:spcPts val="600"/>
+        </a:spcAft>
+        <a:buClr>
+          <a:schemeClr val="tx2"/>
+        </a:buClr>
         <a:buFont typeface="Arial" pitchFamily="34" charset="0"/>
         <a:buChar char="•"/>
-        <a:defRPr sz="2000" kern="1200">
+        <a:defRPr sz="1700" kern="1200">
           <a:solidFill>
             <a:schemeClr val="tx1"/>
           </a:solidFill>
@@ -3097,46 +3516,165 @@
       </p:grpSpPr>
       <p:sp>
         <p:nvSpPr>
-          <p:cNvPr id="2" name="Title 1"/>
-          <p:cNvSpPr>
-            <a:spLocks noGrp="1"/>
-          </p:cNvSpPr>
-          <p:nvPr>
-            <p:ph type="ctrTitle"/>
-          </p:nvPr>
-        </p:nvSpPr>
-        <p:spPr/>
-        <p:txBody>
-          <a:bodyPr/>
-          <a:lstStyle/>
-          <a:p>
-            <a:endParaRPr lang="en-US"/>
-          </a:p>
-        </p:txBody>
-      </p:sp>
-      <p:sp>
-        <p:nvSpPr>
-          <p:cNvPr id="3" name="Subtitle 2"/>
-          <p:cNvSpPr>
-            <a:spLocks noGrp="1"/>
-          </p:cNvSpPr>
-          <p:nvPr>
-            <p:ph type="subTitle" idx="1"/>
-          </p:nvPr>
-        </p:nvSpPr>
-        <p:spPr/>
-        <p:txBody>
-          <a:bodyPr/>
-          <a:lstStyle/>
-          <a:p>
-            <a:endParaRPr lang="en-US"/>
+          <p:cNvPr id="4" name="TextBox 3"/>
+          <p:cNvSpPr txBox="1"/>
+          <p:nvPr/>
+        </p:nvSpPr>
+        <p:spPr>
+          <a:xfrm>
+            <a:off x="1627908" y="1600200"/>
+            <a:ext cx="6019800" cy="4985980"/>
+          </a:xfrm>
+          <a:prstGeom prst="rect">
+            <a:avLst/>
+          </a:prstGeom>
+          <a:noFill/>
+        </p:spPr>
+        <p:txBody>
+          <a:bodyPr wrap="square" rtlCol="0">
+            <a:spAutoFit/>
+          </a:bodyPr>
+          <a:lstStyle/>
+          <a:p>
+            <a:pPr algn="ctr"/>
+            <a:r>
+              <a:rPr lang="en-US" sz="7200" dirty="0" smtClean="0"/>
+              <a:t>EnginX 2018</a:t>
+            </a:r>
+          </a:p>
+          <a:p>
+            <a:pPr algn="ctr"/>
+            <a:endParaRPr lang="en-US" dirty="0"/>
+          </a:p>
+          <a:p>
+            <a:pPr algn="ctr"/>
+            <a:r>
+              <a:rPr lang="en-US" sz="4800" dirty="0" smtClean="0"/>
+              <a:t>Domini-uim</a:t>
+            </a:r>
+          </a:p>
+          <a:p>
+            <a:pPr algn="ctr"/>
+            <a:endParaRPr lang="en-US" dirty="0" smtClean="0"/>
+          </a:p>
+          <a:p>
+            <a:pPr algn="ctr"/>
+            <a:endParaRPr lang="en-US" dirty="0"/>
+          </a:p>
+          <a:p>
+            <a:pPr algn="ctr">
+              <a:lnSpc>
+                <a:spcPct val="150000"/>
+              </a:lnSpc>
+            </a:pPr>
+            <a:r>
+              <a:rPr lang="en-US" dirty="0" smtClean="0">
+                <a:latin typeface="Bahnschrift Light" pitchFamily="34" charset="0"/>
+              </a:rPr>
+              <a:t>Shujanya Ray (CSE 4</a:t>
+            </a:r>
+            <a:r>
+              <a:rPr lang="en-US" baseline="30000" dirty="0" smtClean="0">
+                <a:latin typeface="Bahnschrift Light" pitchFamily="34" charset="0"/>
+              </a:rPr>
+              <a:t>th</a:t>
+            </a:r>
+            <a:r>
+              <a:rPr lang="en-US" dirty="0" smtClean="0">
+                <a:latin typeface="Bahnschrift Light" pitchFamily="34" charset="0"/>
+              </a:rPr>
+              <a:t> Yr)</a:t>
+            </a:r>
+          </a:p>
+          <a:p>
+            <a:pPr algn="ctr">
+              <a:lnSpc>
+                <a:spcPct val="150000"/>
+              </a:lnSpc>
+            </a:pPr>
+            <a:r>
+              <a:rPr lang="en-US" dirty="0" smtClean="0">
+                <a:latin typeface="Bahnschrift Light" pitchFamily="34" charset="0"/>
+              </a:rPr>
+              <a:t>Saunak Das (CSE 4</a:t>
+            </a:r>
+            <a:r>
+              <a:rPr lang="en-US" baseline="30000" dirty="0" smtClean="0">
+                <a:latin typeface="Bahnschrift Light" pitchFamily="34" charset="0"/>
+              </a:rPr>
+              <a:t>th</a:t>
+            </a:r>
+            <a:r>
+              <a:rPr lang="en-US" dirty="0" smtClean="0">
+                <a:latin typeface="Bahnschrift Light" pitchFamily="34" charset="0"/>
+              </a:rPr>
+              <a:t> Yr)</a:t>
+            </a:r>
+          </a:p>
+          <a:p>
+            <a:pPr algn="ctr">
+              <a:lnSpc>
+                <a:spcPct val="150000"/>
+              </a:lnSpc>
+            </a:pPr>
+            <a:r>
+              <a:rPr lang="en-US" dirty="0" smtClean="0">
+                <a:latin typeface="Bahnschrift Light" pitchFamily="34" charset="0"/>
+              </a:rPr>
+              <a:t>Anubhav Singh (IT 3</a:t>
+            </a:r>
+            <a:r>
+              <a:rPr lang="en-US" baseline="30000" dirty="0" smtClean="0">
+                <a:latin typeface="Bahnschrift Light" pitchFamily="34" charset="0"/>
+              </a:rPr>
+              <a:t>rd</a:t>
+            </a:r>
+            <a:r>
+              <a:rPr lang="en-US" dirty="0" smtClean="0">
+                <a:latin typeface="Bahnschrift Light" pitchFamily="34" charset="0"/>
+              </a:rPr>
+              <a:t> Yr)</a:t>
+            </a:r>
+          </a:p>
+          <a:p>
+            <a:pPr algn="ctr">
+              <a:lnSpc>
+                <a:spcPct val="150000"/>
+              </a:lnSpc>
+            </a:pPr>
+            <a:r>
+              <a:rPr lang="en-US" dirty="0" smtClean="0">
+                <a:latin typeface="Bahnschrift Light" pitchFamily="34" charset="0"/>
+              </a:rPr>
+              <a:t>Ayush Thakur (ECE  3</a:t>
+            </a:r>
+            <a:r>
+              <a:rPr lang="en-US" baseline="30000" dirty="0" smtClean="0">
+                <a:latin typeface="Bahnschrift Light" pitchFamily="34" charset="0"/>
+              </a:rPr>
+              <a:t>rd </a:t>
+            </a:r>
+            <a:r>
+              <a:rPr lang="en-US" dirty="0" smtClean="0">
+                <a:latin typeface="Bahnschrift Light" pitchFamily="34" charset="0"/>
+              </a:rPr>
+              <a:t> Yr)</a:t>
+            </a:r>
+          </a:p>
+          <a:p>
+            <a:pPr algn="ctr"/>
+            <a:endParaRPr lang="en-US" dirty="0" smtClean="0"/>
+          </a:p>
+          <a:p>
+            <a:pPr algn="ctr"/>
+            <a:endParaRPr lang="en-US" dirty="0"/>
           </a:p>
         </p:txBody>
       </p:sp>
     </p:spTree>
     <p:extLst>
       <p:ext uri="{BB962C8B-B14F-4D97-AF65-F5344CB8AC3E}">
-        <p14:creationId xmlns:p14="http://schemas.microsoft.com/office/powerpoint/2010/main" val="2123175555"/>
+        <p14:creationId xmlns:p14="http://schemas.microsoft.com/office/powerpoint/2010/main" val="3965176002"/>
       </p:ext>
     </p:extLst>
   </p:cSld>
@@ -3147,93 +3685,58 @@
 </file>
 
 <file path=ppt/theme/theme1.xml><?xml version="1.0" encoding="utf-8"?>
-<a:theme xmlns:a="http://schemas.openxmlformats.org/drawingml/2006/main" name="Office Theme">
+<a:theme xmlns:a="http://schemas.openxmlformats.org/drawingml/2006/main" name="Horizon">
   <a:themeElements>
-    <a:clrScheme name="Office">
+    <a:clrScheme name="Horizon">
       <a:dk1>
-        <a:sysClr val="windowText" lastClr="000000"/>
+        <a:srgbClr val="000000"/>
       </a:dk1>
       <a:lt1>
-        <a:sysClr val="window" lastClr="FFFFFF"/>
+        <a:srgbClr val="FFFFFF"/>
       </a:lt1>
       <a:dk2>
-        <a:srgbClr val="1F497D"/>
+        <a:srgbClr val="1F2123"/>
       </a:dk2>
       <a:lt2>
-        <a:srgbClr val="EEECE1"/>
+        <a:srgbClr val="DC9E1F"/>
       </a:lt2>
       <a:accent1>
-        <a:srgbClr val="4F81BD"/>
+        <a:srgbClr val="7E97AD"/>
       </a:accent1>
       <a:accent2>
-        <a:srgbClr val="C0504D"/>
+        <a:srgbClr val="CC8E60"/>
       </a:accent2>
       <a:accent3>
-        <a:srgbClr val="9BBB59"/>
+        <a:srgbClr val="7A6A60"/>
       </a:accent3>
       <a:accent4>
-        <a:srgbClr val="8064A2"/>
+        <a:srgbClr val="B4936D"/>
       </a:accent4>
       <a:accent5>
-        <a:srgbClr val="4BACC6"/>
+        <a:srgbClr val="67787B"/>
       </a:accent5>
       <a:accent6>
-        <a:srgbClr val="F79646"/>
+        <a:srgbClr val="9D936F"/>
       </a:accent6>
       <a:hlink>
-        <a:srgbClr val="0000FF"/>
+        <a:srgbClr val="646464"/>
       </a:hlink>
       <a:folHlink>
-        <a:srgbClr val="800080"/>
+        <a:srgbClr val="969696"/>
       </a:folHlink>
     </a:clrScheme>
-    <a:fontScheme name="Office">
+    <a:fontScheme name="Horizon">
       <a:majorFont>
-        <a:latin typeface="Calibri"/>
+        <a:latin typeface="Arial Narrow"/>
         <a:ea typeface=""/>
         <a:cs typeface=""/>
-        <a:font script="Jpan" typeface="ＭＳ Ｐゴシック"/>
-        <a:font script="Hang" typeface="맑은 고딕"/>
-        <a:font script="Hans" typeface="宋体"/>
-        <a:font script="Hant" typeface="新細明體"/>
-        <a:font script="Arab" typeface="Times New Roman"/>
-        <a:font script="Hebr" typeface="Times New Roman"/>
-        <a:font script="Thai" typeface="Angsana New"/>
-        <a:font script="Ethi" typeface="Nyala"/>
-        <a:font script="Beng" typeface="Vrinda"/>
-        <a:font script="Gujr" typeface="Shruti"/>
-        <a:font script="Khmr" typeface="MoolBoran"/>
-        <a:font script="Knda" typeface="Tunga"/>
-        <a:font script="Guru" typeface="Raavi"/>
-        <a:font script="Cans" typeface="Euphemia"/>
-        <a:font script="Cher" typeface="Plantagenet Cherokee"/>
-        <a:font script="Yiii" typeface="Microsoft Yi Baiti"/>
-        <a:font script="Tibt" typeface="Microsoft Himalaya"/>
-        <a:font script="Thaa" typeface="MV Boli"/>
-        <a:font script="Deva" typeface="Mangal"/>
-        <a:font script="Telu" typeface="Gautami"/>
-        <a:font script="Taml" typeface="Latha"/>
-        <a:font script="Syrc" typeface="Estrangelo Edessa"/>
-        <a:font script="Orya" typeface="Kalinga"/>
-        <a:font script="Mlym" typeface="Kartika"/>
-        <a:font script="Laoo" typeface="DokChampa"/>
-        <a:font script="Sinh" typeface="Iskoola Pota"/>
-        <a:font script="Mong" typeface="Mongolian Baiti"/>
-        <a:font script="Viet" typeface="Times New Roman"/>
-        <a:font script="Uigh" typeface="Microsoft Uighur"/>
-        <a:font script="Geor" typeface="Sylfaen"/>
-      </a:majorFont>
-      <a:minorFont>
-        <a:latin typeface="Calibri"/>
-        <a:ea typeface=""/>
-        <a:cs typeface=""/>
-        <a:font script="Jpan" typeface="ＭＳ Ｐゴシック"/>
-        <a:font script="Hang" typeface="맑은 고딕"/>
-        <a:font script="Hans" typeface="宋体"/>
-        <a:font script="Hant" typeface="新細明體"/>
+        <a:font script="Jpan" typeface="HGｺﾞｼｯｸM"/>
+        <a:font script="Hang" typeface="HY얕은샘물M"/>
+        <a:font script="Hans" typeface="方正姚体"/>
+        <a:font script="Hant" typeface="微軟正黑體"/>
         <a:font script="Arab" typeface="Arial"/>
-        <a:font script="Hebr" typeface="Arial"/>
-        <a:font script="Thai" typeface="Cordia New"/>
+        <a:font script="Hebr" typeface="Levenim MT"/>
+        <a:font script="Thai" typeface="FreesiaUPC"/>
         <a:font script="Ethi" typeface="Nyala"/>
         <a:font script="Beng" typeface="Vrinda"/>
         <a:font script="Gujr" typeface="Shruti"/>
@@ -3254,12 +3757,47 @@
         <a:font script="Laoo" typeface="DokChampa"/>
         <a:font script="Sinh" typeface="Iskoola Pota"/>
         <a:font script="Mong" typeface="Mongolian Baiti"/>
-        <a:font script="Viet" typeface="Arial"/>
+        <a:font script="Viet" typeface="Tahoma"/>
+        <a:font script="Uigh" typeface="Microsoft Uighur"/>
+        <a:font script="Geor" typeface="Sylfaen"/>
+      </a:majorFont>
+      <a:minorFont>
+        <a:latin typeface="Arial Narrow"/>
+        <a:ea typeface=""/>
+        <a:cs typeface=""/>
+        <a:font script="Jpan" typeface="HGｺﾞｼｯｸM"/>
+        <a:font script="Hang" typeface="HY얕은샘물M"/>
+        <a:font script="Hans" typeface="方正姚体"/>
+        <a:font script="Hant" typeface="微軟正黑體"/>
+        <a:font script="Arab" typeface="Arial"/>
+        <a:font script="Hebr" typeface="Levenim MT"/>
+        <a:font script="Thai" typeface="FreesiaUPC"/>
+        <a:font script="Ethi" typeface="Nyala"/>
+        <a:font script="Beng" typeface="Vrinda"/>
+        <a:font script="Gujr" typeface="Shruti"/>
+        <a:font script="Khmr" typeface="DaunPenh"/>
+        <a:font script="Knda" typeface="Tunga"/>
+        <a:font script="Guru" typeface="Raavi"/>
+        <a:font script="Cans" typeface="Euphemia"/>
+        <a:font script="Cher" typeface="Plantagenet Cherokee"/>
+        <a:font script="Yiii" typeface="Microsoft Yi Baiti"/>
+        <a:font script="Tibt" typeface="Microsoft Himalaya"/>
+        <a:font script="Thaa" typeface="MV Boli"/>
+        <a:font script="Deva" typeface="Mangal"/>
+        <a:font script="Telu" typeface="Gautami"/>
+        <a:font script="Taml" typeface="Latha"/>
+        <a:font script="Syrc" typeface="Estrangelo Edessa"/>
+        <a:font script="Orya" typeface="Kalinga"/>
+        <a:font script="Mlym" typeface="Kartika"/>
+        <a:font script="Laoo" typeface="DokChampa"/>
+        <a:font script="Sinh" typeface="Iskoola Pota"/>
+        <a:font script="Mong" typeface="Mongolian Baiti"/>
+        <a:font script="Viet" typeface="Tahoma"/>
         <a:font script="Uigh" typeface="Microsoft Uighur"/>
         <a:font script="Geor" typeface="Sylfaen"/>
       </a:minorFont>
     </a:fontScheme>
-    <a:fmtScheme name="Office">
+    <a:fmtScheme name="Horizon">
       <a:fillStyleLst>
         <a:solidFill>
           <a:schemeClr val="phClr"/>
@@ -3268,68 +3806,62 @@
           <a:gsLst>
             <a:gs pos="0">
               <a:schemeClr val="phClr">
-                <a:tint val="50000"/>
-                <a:satMod val="300000"/>
-              </a:schemeClr>
-            </a:gs>
-            <a:gs pos="35000">
-              <a:schemeClr val="phClr">
-                <a:tint val="37000"/>
-                <a:satMod val="300000"/>
+                <a:tint val="83000"/>
+                <a:shade val="100000"/>
+                <a:satMod val="100000"/>
               </a:schemeClr>
             </a:gs>
             <a:gs pos="100000">
               <a:schemeClr val="phClr">
-                <a:tint val="15000"/>
-                <a:satMod val="350000"/>
+                <a:tint val="61000"/>
+                <a:alpha val="100000"/>
+                <a:satMod val="200000"/>
               </a:schemeClr>
             </a:gs>
           </a:gsLst>
-          <a:lin ang="16200000" scaled="1"/>
+          <a:path path="circle">
+            <a:fillToRect l="100000" t="100000" r="100000" b="100000"/>
+          </a:path>
         </a:gradFill>
         <a:gradFill rotWithShape="1">
           <a:gsLst>
             <a:gs pos="0">
               <a:schemeClr val="phClr">
-                <a:shade val="51000"/>
-                <a:satMod val="130000"/>
-              </a:schemeClr>
-            </a:gs>
-            <a:gs pos="80000">
-              <a:schemeClr val="phClr">
-                <a:shade val="93000"/>
-                <a:satMod val="130000"/>
+                <a:shade val="85000"/>
               </a:schemeClr>
             </a:gs>
             <a:gs pos="100000">
               <a:schemeClr val="phClr">
-                <a:shade val="94000"/>
-                <a:satMod val="135000"/>
+                <a:tint val="90000"/>
+                <a:alpha val="100000"/>
+                <a:satMod val="200000"/>
               </a:schemeClr>
             </a:gs>
           </a:gsLst>
-          <a:lin ang="16200000" scaled="0"/>
+          <a:path path="circle">
+            <a:fillToRect l="100000" t="100000" r="100000" b="100000"/>
+          </a:path>
         </a:gradFill>
       </a:fillStyleLst>
       <a:lnStyleLst>
         <a:ln w="9525" cap="flat" cmpd="sng" algn="ctr">
           <a:solidFill>
-            <a:schemeClr val="phClr">
-              <a:shade val="95000"/>
-              <a:satMod val="105000"/>
-            </a:schemeClr>
+            <a:schemeClr val="phClr"/>
           </a:solidFill>
           <a:prstDash val="solid"/>
         </a:ln>
-        <a:ln w="25400" cap="flat" cmpd="sng" algn="ctr">
+        <a:ln w="10795" cap="flat" cmpd="sng" algn="ctr">
           <a:solidFill>
             <a:schemeClr val="phClr"/>
           </a:solidFill>
           <a:prstDash val="solid"/>
         </a:ln>
-        <a:ln w="38100" cap="flat" cmpd="sng" algn="ctr">
+        <a:ln w="15240" cap="flat" cmpd="sng" algn="ctr">
           <a:solidFill>
-            <a:schemeClr val="phClr"/>
+            <a:schemeClr val="phClr">
+              <a:tint val="25000"/>
+              <a:alpha val="25000"/>
+            </a:schemeClr>
           </a:solidFill>
           <a:prstDash val="solid"/>
         </a:ln>
@@ -3337,27 +3869,27 @@
       <a:effectStyleLst>
         <a:effectStyle>
           <a:effectLst>
-            <a:outerShdw blurRad="40000" dist="20000" dir="5400000" rotWithShape="0">
+            <a:outerShdw blurRad="38100" dist="25400" dir="5400000" rotWithShape="0">
               <a:srgbClr val="000000">
-                <a:alpha val="38000"/>
+                <a:alpha val="40000"/>
               </a:srgbClr>
             </a:outerShdw>
           </a:effectLst>
         </a:effectStyle>
         <a:effectStyle>
           <a:effectLst>
-            <a:outerShdw blurRad="40000" dist="23000" dir="5400000" rotWithShape="0">
+            <a:outerShdw blurRad="50800" dist="42924" dir="5400000" rotWithShape="0">
               <a:srgbClr val="000000">
-                <a:alpha val="35000"/>
+                <a:alpha val="40000"/>
               </a:srgbClr>
             </a:outerShdw>
           </a:effectLst>
         </a:effectStyle>
         <a:effectStyle>
           <a:effectLst>
-            <a:outerShdw blurRad="40000" dist="23000" dir="5400000" rotWithShape="0">
+            <a:outerShdw blurRad="50800" dist="25400" dir="5400000" rotWithShape="0">
               <a:srgbClr val="000000">
-                <a:alpha val="35000"/>
+                <a:alpha val="40000"/>
               </a:srgbClr>
             </a:outerShdw>
           </a:effectLst>
@@ -3365,12 +3897,12 @@
             <a:camera prst="orthographicFront">
               <a:rot lat="0" lon="0" rev="0"/>
             </a:camera>
-            <a:lightRig rig="threePt" dir="t">
-              <a:rot lat="0" lon="0" rev="1200000"/>
+            <a:lightRig rig="flat" dir="t">
+              <a:rot lat="0" lon="0" rev="3600000"/>
             </a:lightRig>
           </a:scene3d>
-          <a:sp3d>
-            <a:bevelT w="63500" h="25400"/>
+          <a:sp3d prstMaterial="flat">
+            <a:bevelT w="34925" h="47625" prst="coolSlant"/>
           </a:sp3d>
         </a:effectStyle>
       </a:effectStyleLst>
@@ -3382,45 +3914,57 @@
           <a:gsLst>
             <a:gs pos="0">
               <a:schemeClr val="phClr">
-                <a:tint val="40000"/>
-                <a:satMod val="350000"/>
+                <a:tint val="96000"/>
+                <a:shade val="100000"/>
+                <a:alpha val="100000"/>
+                <a:satMod val="140000"/>
               </a:schemeClr>
             </a:gs>
-            <a:gs pos="40000">
+            <a:gs pos="31000">
               <a:schemeClr val="phClr">
-                <a:tint val="45000"/>
-                <a:shade val="99000"/>
-                <a:satMod val="350000"/>
+                <a:tint val="100000"/>
+                <a:shade val="90000"/>
+                <a:alpha val="100000"/>
               </a:schemeClr>
             </a:gs>
             <a:gs pos="100000">
               <a:schemeClr val="phClr">
-                <a:shade val="20000"/>
-                <a:satMod val="255000"/>
+                <a:tint val="100000"/>
+                <a:shade val="80000"/>
+                <a:alpha val="100000"/>
               </a:schemeClr>
             </a:gs>
           </a:gsLst>
-          <a:path path="circle">
-            <a:fillToRect l="50000" t="-80000" r="50000" b="180000"/>
-          </a:path>
+          <a:lin ang="5400000" scaled="0"/>
         </a:gradFill>
         <a:gradFill rotWithShape="1">
           <a:gsLst>
             <a:gs pos="0">
               <a:schemeClr val="phClr">
-                <a:tint val="80000"/>
-                <a:satMod val="300000"/>
+                <a:tint val="96000"/>
+                <a:shade val="100000"/>
+                <a:alpha val="100000"/>
+                <a:satMod val="180000"/>
+              </a:schemeClr>
+            </a:gs>
+            <a:gs pos="41000">
+              <a:schemeClr val="phClr">
+                <a:tint val="100000"/>
+                <a:shade val="100000"/>
+                <a:alpha val="100000"/>
+                <a:satMod val="150000"/>
               </a:schemeClr>
             </a:gs>
             <a:gs pos="100000">
               <a:schemeClr val="phClr">
-                <a:shade val="30000"/>
-                <a:satMod val="200000"/>
+                <a:tint val="100000"/>
+                <a:shade val="65000"/>
+                <a:alpha val="100000"/>
               </a:schemeClr>
             </a:gs>
           </a:gsLst>
           <a:path path="circle">
-            <a:fillToRect l="50000" t="50000" r="50000" b="50000"/>
+            <a:fillToRect l="50000" t="80000" r="100000" b="100000"/>
           </a:path>
         </a:gradFill>
       </a:bgFillStyleLst>

</xml_diff>